<commit_message>
add updated slides - second revision
</commit_message>
<xml_diff>
--- a/Study-Saturday-w3.pptx
+++ b/Study-Saturday-w3.pptx
@@ -109,7 +109,7 @@
   </p:defaultTextStyle>
   <p:extLst>
     <p:ext uri="{EFAFB233-063F-42B5-8137-9DF3F51BA10A}">
-      <p15:sldGuideLst xmlns:p15="http://schemas.microsoft.com/office/powerpoint/2012/main" xmlns:p="http://schemas.openxmlformats.org/presentationml/2006/main" xmlns:r="http://schemas.openxmlformats.org/officeDocument/2006/relationships" xmlns:a="http://schemas.openxmlformats.org/drawingml/2006/main" xmlns=""/>
+      <p15:sldGuideLst xmlns="" xmlns:a="http://schemas.openxmlformats.org/drawingml/2006/main" xmlns:r="http://schemas.openxmlformats.org/officeDocument/2006/relationships" xmlns:p="http://schemas.openxmlformats.org/presentationml/2006/main" xmlns:p15="http://schemas.microsoft.com/office/powerpoint/2012/main" xmlns:mv="urn:schemas-microsoft-com:mac:vml" xmlns:mc="http://schemas.openxmlformats.org/markup-compatibility/2006"/>
     </p:ext>
   </p:extLst>
 </p:presentation>
@@ -137,7 +137,7 @@
           <p:cNvPr id="2" name="Title 1">
             <a:extLst>
               <a:ext uri="{FF2B5EF4-FFF2-40B4-BE49-F238E27FC236}">
-                <a16:creationId xmlns:a16="http://schemas.microsoft.com/office/drawing/2014/main" xmlns:p="http://schemas.openxmlformats.org/presentationml/2006/main" xmlns:r="http://schemas.openxmlformats.org/officeDocument/2006/relationships" xmlns:a="http://schemas.openxmlformats.org/drawingml/2006/main" xmlns="" id="{75EF9547-CB8F-FB4F-A0B6-7564E6CE05ED}"/>
+                <a16:creationId xmlns="" xmlns:a="http://schemas.openxmlformats.org/drawingml/2006/main" xmlns:r="http://schemas.openxmlformats.org/officeDocument/2006/relationships" xmlns:p="http://schemas.openxmlformats.org/presentationml/2006/main" xmlns:a16="http://schemas.microsoft.com/office/drawing/2014/main" xmlns:mv="urn:schemas-microsoft-com:mac:vml" xmlns:mc="http://schemas.openxmlformats.org/markup-compatibility/2006" id="{75EF9547-CB8F-FB4F-A0B6-7564E6CE05ED}"/>
               </a:ext>
             </a:extLst>
           </p:cNvPr>
@@ -174,7 +174,7 @@
           <p:cNvPr id="3" name="Subtitle 2">
             <a:extLst>
               <a:ext uri="{FF2B5EF4-FFF2-40B4-BE49-F238E27FC236}">
-                <a16:creationId xmlns:a16="http://schemas.microsoft.com/office/drawing/2014/main" xmlns:p="http://schemas.openxmlformats.org/presentationml/2006/main" xmlns:r="http://schemas.openxmlformats.org/officeDocument/2006/relationships" xmlns:a="http://schemas.openxmlformats.org/drawingml/2006/main" xmlns="" id="{932C7AD1-ED58-4047-98F0-FC37B8738A39}"/>
+                <a16:creationId xmlns="" xmlns:a="http://schemas.openxmlformats.org/drawingml/2006/main" xmlns:r="http://schemas.openxmlformats.org/officeDocument/2006/relationships" xmlns:p="http://schemas.openxmlformats.org/presentationml/2006/main" xmlns:a16="http://schemas.microsoft.com/office/drawing/2014/main" xmlns:mv="urn:schemas-microsoft-com:mac:vml" xmlns:mc="http://schemas.openxmlformats.org/markup-compatibility/2006" id="{932C7AD1-ED58-4047-98F0-FC37B8738A39}"/>
               </a:ext>
             </a:extLst>
           </p:cNvPr>
@@ -244,7 +244,7 @@
           <p:cNvPr id="4" name="Date Placeholder 3">
             <a:extLst>
               <a:ext uri="{FF2B5EF4-FFF2-40B4-BE49-F238E27FC236}">
-                <a16:creationId xmlns:a16="http://schemas.microsoft.com/office/drawing/2014/main" xmlns:p="http://schemas.openxmlformats.org/presentationml/2006/main" xmlns:r="http://schemas.openxmlformats.org/officeDocument/2006/relationships" xmlns:a="http://schemas.openxmlformats.org/drawingml/2006/main" xmlns="" id="{761A2A64-5ADB-9F42-95A7-0BC222BD6EE2}"/>
+                <a16:creationId xmlns="" xmlns:a="http://schemas.openxmlformats.org/drawingml/2006/main" xmlns:r="http://schemas.openxmlformats.org/officeDocument/2006/relationships" xmlns:p="http://schemas.openxmlformats.org/presentationml/2006/main" xmlns:a16="http://schemas.microsoft.com/office/drawing/2014/main" xmlns:mv="urn:schemas-microsoft-com:mac:vml" xmlns:mc="http://schemas.openxmlformats.org/markup-compatibility/2006" id="{761A2A64-5ADB-9F42-95A7-0BC222BD6EE2}"/>
               </a:ext>
             </a:extLst>
           </p:cNvPr>
@@ -263,7 +263,7 @@
             <a:fld id="{00662177-2CA0-4843-8C19-73F5643914DD}" type="datetimeFigureOut">
               <a:rPr lang="en-US" smtClean="0"/>
               <a:pPr/>
-              <a:t>1/25/21</a:t>
+              <a:t>1/26/21</a:t>
             </a:fld>
             <a:endParaRPr lang="en-US"/>
           </a:p>
@@ -274,7 +274,7 @@
           <p:cNvPr id="5" name="Footer Placeholder 4">
             <a:extLst>
               <a:ext uri="{FF2B5EF4-FFF2-40B4-BE49-F238E27FC236}">
-                <a16:creationId xmlns:a16="http://schemas.microsoft.com/office/drawing/2014/main" xmlns:p="http://schemas.openxmlformats.org/presentationml/2006/main" xmlns:r="http://schemas.openxmlformats.org/officeDocument/2006/relationships" xmlns:a="http://schemas.openxmlformats.org/drawingml/2006/main" xmlns="" id="{2142FAA9-5801-314B-9F22-0C92CCCDB9EB}"/>
+                <a16:creationId xmlns="" xmlns:a="http://schemas.openxmlformats.org/drawingml/2006/main" xmlns:r="http://schemas.openxmlformats.org/officeDocument/2006/relationships" xmlns:p="http://schemas.openxmlformats.org/presentationml/2006/main" xmlns:a16="http://schemas.microsoft.com/office/drawing/2014/main" xmlns:mv="urn:schemas-microsoft-com:mac:vml" xmlns:mc="http://schemas.openxmlformats.org/markup-compatibility/2006" id="{2142FAA9-5801-314B-9F22-0C92CCCDB9EB}"/>
               </a:ext>
             </a:extLst>
           </p:cNvPr>
@@ -299,7 +299,7 @@
           <p:cNvPr id="6" name="Slide Number Placeholder 5">
             <a:extLst>
               <a:ext uri="{FF2B5EF4-FFF2-40B4-BE49-F238E27FC236}">
-                <a16:creationId xmlns:a16="http://schemas.microsoft.com/office/drawing/2014/main" xmlns:p="http://schemas.openxmlformats.org/presentationml/2006/main" xmlns:r="http://schemas.openxmlformats.org/officeDocument/2006/relationships" xmlns:a="http://schemas.openxmlformats.org/drawingml/2006/main" xmlns="" id="{17F3A309-7F3C-4E44-8567-915A0C4DE94A}"/>
+                <a16:creationId xmlns="" xmlns:a="http://schemas.openxmlformats.org/drawingml/2006/main" xmlns:r="http://schemas.openxmlformats.org/officeDocument/2006/relationships" xmlns:p="http://schemas.openxmlformats.org/presentationml/2006/main" xmlns:a16="http://schemas.microsoft.com/office/drawing/2014/main" xmlns:mv="urn:schemas-microsoft-com:mac:vml" xmlns:mc="http://schemas.openxmlformats.org/markup-compatibility/2006" id="{17F3A309-7F3C-4E44-8567-915A0C4DE94A}"/>
               </a:ext>
             </a:extLst>
           </p:cNvPr>
@@ -327,7 +327,7 @@
     </p:spTree>
     <p:extLst>
       <p:ext uri="{BB962C8B-B14F-4D97-AF65-F5344CB8AC3E}">
-        <p14:creationId xmlns:p14="http://schemas.microsoft.com/office/powerpoint/2010/main" xmlns:p="http://schemas.openxmlformats.org/presentationml/2006/main" xmlns:r="http://schemas.openxmlformats.org/officeDocument/2006/relationships" xmlns:a="http://schemas.openxmlformats.org/drawingml/2006/main" xmlns="" val="579641904"/>
+        <p14:creationId xmlns="" xmlns:a="http://schemas.openxmlformats.org/drawingml/2006/main" xmlns:r="http://schemas.openxmlformats.org/officeDocument/2006/relationships" xmlns:p="http://schemas.openxmlformats.org/presentationml/2006/main" xmlns:p14="http://schemas.microsoft.com/office/powerpoint/2010/main" xmlns:mv="urn:schemas-microsoft-com:mac:vml" xmlns:mc="http://schemas.openxmlformats.org/markup-compatibility/2006" val="579641904"/>
       </p:ext>
     </p:extLst>
   </p:cSld>
@@ -359,7 +359,7 @@
           <p:cNvPr id="2" name="Title 1">
             <a:extLst>
               <a:ext uri="{FF2B5EF4-FFF2-40B4-BE49-F238E27FC236}">
-                <a16:creationId xmlns:a16="http://schemas.microsoft.com/office/drawing/2014/main" xmlns:p="http://schemas.openxmlformats.org/presentationml/2006/main" xmlns:r="http://schemas.openxmlformats.org/officeDocument/2006/relationships" xmlns:a="http://schemas.openxmlformats.org/drawingml/2006/main" xmlns="" id="{BD9B44A2-957A-A449-A6A3-1C619D127D05}"/>
+                <a16:creationId xmlns="" xmlns:a="http://schemas.openxmlformats.org/drawingml/2006/main" xmlns:r="http://schemas.openxmlformats.org/officeDocument/2006/relationships" xmlns:p="http://schemas.openxmlformats.org/presentationml/2006/main" xmlns:a16="http://schemas.microsoft.com/office/drawing/2014/main" xmlns:mv="urn:schemas-microsoft-com:mac:vml" xmlns:mc="http://schemas.openxmlformats.org/markup-compatibility/2006" id="{BD9B44A2-957A-A449-A6A3-1C619D127D05}"/>
               </a:ext>
             </a:extLst>
           </p:cNvPr>
@@ -387,7 +387,7 @@
           <p:cNvPr id="3" name="Vertical Text Placeholder 2">
             <a:extLst>
               <a:ext uri="{FF2B5EF4-FFF2-40B4-BE49-F238E27FC236}">
-                <a16:creationId xmlns:a16="http://schemas.microsoft.com/office/drawing/2014/main" xmlns:p="http://schemas.openxmlformats.org/presentationml/2006/main" xmlns:r="http://schemas.openxmlformats.org/officeDocument/2006/relationships" xmlns:a="http://schemas.openxmlformats.org/drawingml/2006/main" xmlns="" id="{5E183044-D603-144D-9DCC-359167C9F4C5}"/>
+                <a16:creationId xmlns="" xmlns:a="http://schemas.openxmlformats.org/drawingml/2006/main" xmlns:r="http://schemas.openxmlformats.org/officeDocument/2006/relationships" xmlns:p="http://schemas.openxmlformats.org/presentationml/2006/main" xmlns:a16="http://schemas.microsoft.com/office/drawing/2014/main" xmlns:mv="urn:schemas-microsoft-com:mac:vml" xmlns:mc="http://schemas.openxmlformats.org/markup-compatibility/2006" id="{5E183044-D603-144D-9DCC-359167C9F4C5}"/>
               </a:ext>
             </a:extLst>
           </p:cNvPr>
@@ -444,7 +444,7 @@
           <p:cNvPr id="4" name="Date Placeholder 3">
             <a:extLst>
               <a:ext uri="{FF2B5EF4-FFF2-40B4-BE49-F238E27FC236}">
-                <a16:creationId xmlns:a16="http://schemas.microsoft.com/office/drawing/2014/main" xmlns:p="http://schemas.openxmlformats.org/presentationml/2006/main" xmlns:r="http://schemas.openxmlformats.org/officeDocument/2006/relationships" xmlns:a="http://schemas.openxmlformats.org/drawingml/2006/main" xmlns="" id="{2C87C5E5-27E4-B345-9522-B4EAEB975384}"/>
+                <a16:creationId xmlns="" xmlns:a="http://schemas.openxmlformats.org/drawingml/2006/main" xmlns:r="http://schemas.openxmlformats.org/officeDocument/2006/relationships" xmlns:p="http://schemas.openxmlformats.org/presentationml/2006/main" xmlns:a16="http://schemas.microsoft.com/office/drawing/2014/main" xmlns:mv="urn:schemas-microsoft-com:mac:vml" xmlns:mc="http://schemas.openxmlformats.org/markup-compatibility/2006" id="{2C87C5E5-27E4-B345-9522-B4EAEB975384}"/>
               </a:ext>
             </a:extLst>
           </p:cNvPr>
@@ -463,7 +463,7 @@
             <a:fld id="{00662177-2CA0-4843-8C19-73F5643914DD}" type="datetimeFigureOut">
               <a:rPr lang="en-US" smtClean="0"/>
               <a:pPr/>
-              <a:t>1/25/21</a:t>
+              <a:t>1/26/21</a:t>
             </a:fld>
             <a:endParaRPr lang="en-US"/>
           </a:p>
@@ -474,7 +474,7 @@
           <p:cNvPr id="5" name="Footer Placeholder 4">
             <a:extLst>
               <a:ext uri="{FF2B5EF4-FFF2-40B4-BE49-F238E27FC236}">
-                <a16:creationId xmlns:a16="http://schemas.microsoft.com/office/drawing/2014/main" xmlns:p="http://schemas.openxmlformats.org/presentationml/2006/main" xmlns:r="http://schemas.openxmlformats.org/officeDocument/2006/relationships" xmlns:a="http://schemas.openxmlformats.org/drawingml/2006/main" xmlns="" id="{A2BDFCEB-5371-1540-B338-EE3D6AA7ADDC}"/>
+                <a16:creationId xmlns="" xmlns:a="http://schemas.openxmlformats.org/drawingml/2006/main" xmlns:r="http://schemas.openxmlformats.org/officeDocument/2006/relationships" xmlns:p="http://schemas.openxmlformats.org/presentationml/2006/main" xmlns:a16="http://schemas.microsoft.com/office/drawing/2014/main" xmlns:mv="urn:schemas-microsoft-com:mac:vml" xmlns:mc="http://schemas.openxmlformats.org/markup-compatibility/2006" id="{A2BDFCEB-5371-1540-B338-EE3D6AA7ADDC}"/>
               </a:ext>
             </a:extLst>
           </p:cNvPr>
@@ -499,7 +499,7 @@
           <p:cNvPr id="6" name="Slide Number Placeholder 5">
             <a:extLst>
               <a:ext uri="{FF2B5EF4-FFF2-40B4-BE49-F238E27FC236}">
-                <a16:creationId xmlns:a16="http://schemas.microsoft.com/office/drawing/2014/main" xmlns:p="http://schemas.openxmlformats.org/presentationml/2006/main" xmlns:r="http://schemas.openxmlformats.org/officeDocument/2006/relationships" xmlns:a="http://schemas.openxmlformats.org/drawingml/2006/main" xmlns="" id="{AE555276-3218-3445-BAA1-B88B746F6CD4}"/>
+                <a16:creationId xmlns="" xmlns:a="http://schemas.openxmlformats.org/drawingml/2006/main" xmlns:r="http://schemas.openxmlformats.org/officeDocument/2006/relationships" xmlns:p="http://schemas.openxmlformats.org/presentationml/2006/main" xmlns:a16="http://schemas.microsoft.com/office/drawing/2014/main" xmlns:mv="urn:schemas-microsoft-com:mac:vml" xmlns:mc="http://schemas.openxmlformats.org/markup-compatibility/2006" id="{AE555276-3218-3445-BAA1-B88B746F6CD4}"/>
               </a:ext>
             </a:extLst>
           </p:cNvPr>
@@ -527,7 +527,7 @@
     </p:spTree>
     <p:extLst>
       <p:ext uri="{BB962C8B-B14F-4D97-AF65-F5344CB8AC3E}">
-        <p14:creationId xmlns:p14="http://schemas.microsoft.com/office/powerpoint/2010/main" xmlns:p="http://schemas.openxmlformats.org/presentationml/2006/main" xmlns:r="http://schemas.openxmlformats.org/officeDocument/2006/relationships" xmlns:a="http://schemas.openxmlformats.org/drawingml/2006/main" xmlns="" val="3398555858"/>
+        <p14:creationId xmlns="" xmlns:a="http://schemas.openxmlformats.org/drawingml/2006/main" xmlns:r="http://schemas.openxmlformats.org/officeDocument/2006/relationships" xmlns:p="http://schemas.openxmlformats.org/presentationml/2006/main" xmlns:p14="http://schemas.microsoft.com/office/powerpoint/2010/main" xmlns:mv="urn:schemas-microsoft-com:mac:vml" xmlns:mc="http://schemas.openxmlformats.org/markup-compatibility/2006" val="3398555858"/>
       </p:ext>
     </p:extLst>
   </p:cSld>
@@ -559,7 +559,7 @@
           <p:cNvPr id="2" name="Vertical Title 1">
             <a:extLst>
               <a:ext uri="{FF2B5EF4-FFF2-40B4-BE49-F238E27FC236}">
-                <a16:creationId xmlns:a16="http://schemas.microsoft.com/office/drawing/2014/main" xmlns:p="http://schemas.openxmlformats.org/presentationml/2006/main" xmlns:r="http://schemas.openxmlformats.org/officeDocument/2006/relationships" xmlns:a="http://schemas.openxmlformats.org/drawingml/2006/main" xmlns="" id="{66F99C80-73B8-DB49-9D24-64762C855916}"/>
+                <a16:creationId xmlns="" xmlns:a="http://schemas.openxmlformats.org/drawingml/2006/main" xmlns:r="http://schemas.openxmlformats.org/officeDocument/2006/relationships" xmlns:p="http://schemas.openxmlformats.org/presentationml/2006/main" xmlns:a16="http://schemas.microsoft.com/office/drawing/2014/main" xmlns:mv="urn:schemas-microsoft-com:mac:vml" xmlns:mc="http://schemas.openxmlformats.org/markup-compatibility/2006" id="{66F99C80-73B8-DB49-9D24-64762C855916}"/>
               </a:ext>
             </a:extLst>
           </p:cNvPr>
@@ -592,7 +592,7 @@
           <p:cNvPr id="3" name="Vertical Text Placeholder 2">
             <a:extLst>
               <a:ext uri="{FF2B5EF4-FFF2-40B4-BE49-F238E27FC236}">
-                <a16:creationId xmlns:a16="http://schemas.microsoft.com/office/drawing/2014/main" xmlns:p="http://schemas.openxmlformats.org/presentationml/2006/main" xmlns:r="http://schemas.openxmlformats.org/officeDocument/2006/relationships" xmlns:a="http://schemas.openxmlformats.org/drawingml/2006/main" xmlns="" id="{FEA2A0C3-B5F4-2B45-B6CE-C25ADBE4B157}"/>
+                <a16:creationId xmlns="" xmlns:a="http://schemas.openxmlformats.org/drawingml/2006/main" xmlns:r="http://schemas.openxmlformats.org/officeDocument/2006/relationships" xmlns:p="http://schemas.openxmlformats.org/presentationml/2006/main" xmlns:a16="http://schemas.microsoft.com/office/drawing/2014/main" xmlns:mv="urn:schemas-microsoft-com:mac:vml" xmlns:mc="http://schemas.openxmlformats.org/markup-compatibility/2006" id="{FEA2A0C3-B5F4-2B45-B6CE-C25ADBE4B157}"/>
               </a:ext>
             </a:extLst>
           </p:cNvPr>
@@ -654,7 +654,7 @@
           <p:cNvPr id="4" name="Date Placeholder 3">
             <a:extLst>
               <a:ext uri="{FF2B5EF4-FFF2-40B4-BE49-F238E27FC236}">
-                <a16:creationId xmlns:a16="http://schemas.microsoft.com/office/drawing/2014/main" xmlns:p="http://schemas.openxmlformats.org/presentationml/2006/main" xmlns:r="http://schemas.openxmlformats.org/officeDocument/2006/relationships" xmlns:a="http://schemas.openxmlformats.org/drawingml/2006/main" xmlns="" id="{B9830EDB-1FD9-4B4F-AC20-9A3DCE823FDC}"/>
+                <a16:creationId xmlns="" xmlns:a="http://schemas.openxmlformats.org/drawingml/2006/main" xmlns:r="http://schemas.openxmlformats.org/officeDocument/2006/relationships" xmlns:p="http://schemas.openxmlformats.org/presentationml/2006/main" xmlns:a16="http://schemas.microsoft.com/office/drawing/2014/main" xmlns:mv="urn:schemas-microsoft-com:mac:vml" xmlns:mc="http://schemas.openxmlformats.org/markup-compatibility/2006" id="{B9830EDB-1FD9-4B4F-AC20-9A3DCE823FDC}"/>
               </a:ext>
             </a:extLst>
           </p:cNvPr>
@@ -673,7 +673,7 @@
             <a:fld id="{00662177-2CA0-4843-8C19-73F5643914DD}" type="datetimeFigureOut">
               <a:rPr lang="en-US" smtClean="0"/>
               <a:pPr/>
-              <a:t>1/25/21</a:t>
+              <a:t>1/26/21</a:t>
             </a:fld>
             <a:endParaRPr lang="en-US"/>
           </a:p>
@@ -684,7 +684,7 @@
           <p:cNvPr id="5" name="Footer Placeholder 4">
             <a:extLst>
               <a:ext uri="{FF2B5EF4-FFF2-40B4-BE49-F238E27FC236}">
-                <a16:creationId xmlns:a16="http://schemas.microsoft.com/office/drawing/2014/main" xmlns:p="http://schemas.openxmlformats.org/presentationml/2006/main" xmlns:r="http://schemas.openxmlformats.org/officeDocument/2006/relationships" xmlns:a="http://schemas.openxmlformats.org/drawingml/2006/main" xmlns="" id="{4B56D2BD-2DF7-E943-96DF-5806398C9122}"/>
+                <a16:creationId xmlns="" xmlns:a="http://schemas.openxmlformats.org/drawingml/2006/main" xmlns:r="http://schemas.openxmlformats.org/officeDocument/2006/relationships" xmlns:p="http://schemas.openxmlformats.org/presentationml/2006/main" xmlns:a16="http://schemas.microsoft.com/office/drawing/2014/main" xmlns:mv="urn:schemas-microsoft-com:mac:vml" xmlns:mc="http://schemas.openxmlformats.org/markup-compatibility/2006" id="{4B56D2BD-2DF7-E943-96DF-5806398C9122}"/>
               </a:ext>
             </a:extLst>
           </p:cNvPr>
@@ -709,7 +709,7 @@
           <p:cNvPr id="6" name="Slide Number Placeholder 5">
             <a:extLst>
               <a:ext uri="{FF2B5EF4-FFF2-40B4-BE49-F238E27FC236}">
-                <a16:creationId xmlns:a16="http://schemas.microsoft.com/office/drawing/2014/main" xmlns:p="http://schemas.openxmlformats.org/presentationml/2006/main" xmlns:r="http://schemas.openxmlformats.org/officeDocument/2006/relationships" xmlns:a="http://schemas.openxmlformats.org/drawingml/2006/main" xmlns="" id="{BC5FEFEC-3472-104C-9E73-867E5B28A0E9}"/>
+                <a16:creationId xmlns="" xmlns:a="http://schemas.openxmlformats.org/drawingml/2006/main" xmlns:r="http://schemas.openxmlformats.org/officeDocument/2006/relationships" xmlns:p="http://schemas.openxmlformats.org/presentationml/2006/main" xmlns:a16="http://schemas.microsoft.com/office/drawing/2014/main" xmlns:mv="urn:schemas-microsoft-com:mac:vml" xmlns:mc="http://schemas.openxmlformats.org/markup-compatibility/2006" id="{BC5FEFEC-3472-104C-9E73-867E5B28A0E9}"/>
               </a:ext>
             </a:extLst>
           </p:cNvPr>
@@ -737,7 +737,7 @@
     </p:spTree>
     <p:extLst>
       <p:ext uri="{BB962C8B-B14F-4D97-AF65-F5344CB8AC3E}">
-        <p14:creationId xmlns:p14="http://schemas.microsoft.com/office/powerpoint/2010/main" xmlns:p="http://schemas.openxmlformats.org/presentationml/2006/main" xmlns:r="http://schemas.openxmlformats.org/officeDocument/2006/relationships" xmlns:a="http://schemas.openxmlformats.org/drawingml/2006/main" xmlns="" val="1851357551"/>
+        <p14:creationId xmlns="" xmlns:a="http://schemas.openxmlformats.org/drawingml/2006/main" xmlns:r="http://schemas.openxmlformats.org/officeDocument/2006/relationships" xmlns:p="http://schemas.openxmlformats.org/presentationml/2006/main" xmlns:p14="http://schemas.microsoft.com/office/powerpoint/2010/main" xmlns:mv="urn:schemas-microsoft-com:mac:vml" xmlns:mc="http://schemas.openxmlformats.org/markup-compatibility/2006" val="1851357551"/>
       </p:ext>
     </p:extLst>
   </p:cSld>
@@ -769,7 +769,7 @@
           <p:cNvPr id="2" name="Title 1">
             <a:extLst>
               <a:ext uri="{FF2B5EF4-FFF2-40B4-BE49-F238E27FC236}">
-                <a16:creationId xmlns:a16="http://schemas.microsoft.com/office/drawing/2014/main" xmlns:p="http://schemas.openxmlformats.org/presentationml/2006/main" xmlns:r="http://schemas.openxmlformats.org/officeDocument/2006/relationships" xmlns:a="http://schemas.openxmlformats.org/drawingml/2006/main" xmlns="" id="{45B8F2DA-C8A9-864B-9D37-350BFB45E95C}"/>
+                <a16:creationId xmlns="" xmlns:a="http://schemas.openxmlformats.org/drawingml/2006/main" xmlns:r="http://schemas.openxmlformats.org/officeDocument/2006/relationships" xmlns:p="http://schemas.openxmlformats.org/presentationml/2006/main" xmlns:a16="http://schemas.microsoft.com/office/drawing/2014/main" xmlns:mv="urn:schemas-microsoft-com:mac:vml" xmlns:mc="http://schemas.openxmlformats.org/markup-compatibility/2006" id="{45B8F2DA-C8A9-864B-9D37-350BFB45E95C}"/>
               </a:ext>
             </a:extLst>
           </p:cNvPr>
@@ -797,7 +797,7 @@
           <p:cNvPr id="3" name="Content Placeholder 2">
             <a:extLst>
               <a:ext uri="{FF2B5EF4-FFF2-40B4-BE49-F238E27FC236}">
-                <a16:creationId xmlns:a16="http://schemas.microsoft.com/office/drawing/2014/main" xmlns:p="http://schemas.openxmlformats.org/presentationml/2006/main" xmlns:r="http://schemas.openxmlformats.org/officeDocument/2006/relationships" xmlns:a="http://schemas.openxmlformats.org/drawingml/2006/main" xmlns="" id="{D3CD8CDD-0568-5548-BDC2-5D12A21CC75B}"/>
+                <a16:creationId xmlns="" xmlns:a="http://schemas.openxmlformats.org/drawingml/2006/main" xmlns:r="http://schemas.openxmlformats.org/officeDocument/2006/relationships" xmlns:p="http://schemas.openxmlformats.org/presentationml/2006/main" xmlns:a16="http://schemas.microsoft.com/office/drawing/2014/main" xmlns:mv="urn:schemas-microsoft-com:mac:vml" xmlns:mc="http://schemas.openxmlformats.org/markup-compatibility/2006" id="{D3CD8CDD-0568-5548-BDC2-5D12A21CC75B}"/>
               </a:ext>
             </a:extLst>
           </p:cNvPr>
@@ -854,7 +854,7 @@
           <p:cNvPr id="4" name="Date Placeholder 3">
             <a:extLst>
               <a:ext uri="{FF2B5EF4-FFF2-40B4-BE49-F238E27FC236}">
-                <a16:creationId xmlns:a16="http://schemas.microsoft.com/office/drawing/2014/main" xmlns:p="http://schemas.openxmlformats.org/presentationml/2006/main" xmlns:r="http://schemas.openxmlformats.org/officeDocument/2006/relationships" xmlns:a="http://schemas.openxmlformats.org/drawingml/2006/main" xmlns="" id="{CEB5DBA9-BE52-2C48-9D16-FEC66BA971E1}"/>
+                <a16:creationId xmlns="" xmlns:a="http://schemas.openxmlformats.org/drawingml/2006/main" xmlns:r="http://schemas.openxmlformats.org/officeDocument/2006/relationships" xmlns:p="http://schemas.openxmlformats.org/presentationml/2006/main" xmlns:a16="http://schemas.microsoft.com/office/drawing/2014/main" xmlns:mv="urn:schemas-microsoft-com:mac:vml" xmlns:mc="http://schemas.openxmlformats.org/markup-compatibility/2006" id="{CEB5DBA9-BE52-2C48-9D16-FEC66BA971E1}"/>
               </a:ext>
             </a:extLst>
           </p:cNvPr>
@@ -873,7 +873,7 @@
             <a:fld id="{00662177-2CA0-4843-8C19-73F5643914DD}" type="datetimeFigureOut">
               <a:rPr lang="en-US" smtClean="0"/>
               <a:pPr/>
-              <a:t>1/25/21</a:t>
+              <a:t>1/26/21</a:t>
             </a:fld>
             <a:endParaRPr lang="en-US"/>
           </a:p>
@@ -884,7 +884,7 @@
           <p:cNvPr id="5" name="Footer Placeholder 4">
             <a:extLst>
               <a:ext uri="{FF2B5EF4-FFF2-40B4-BE49-F238E27FC236}">
-                <a16:creationId xmlns:a16="http://schemas.microsoft.com/office/drawing/2014/main" xmlns:p="http://schemas.openxmlformats.org/presentationml/2006/main" xmlns:r="http://schemas.openxmlformats.org/officeDocument/2006/relationships" xmlns:a="http://schemas.openxmlformats.org/drawingml/2006/main" xmlns="" id="{874D3B7F-A68B-CD49-940D-1DE544A27944}"/>
+                <a16:creationId xmlns="" xmlns:a="http://schemas.openxmlformats.org/drawingml/2006/main" xmlns:r="http://schemas.openxmlformats.org/officeDocument/2006/relationships" xmlns:p="http://schemas.openxmlformats.org/presentationml/2006/main" xmlns:a16="http://schemas.microsoft.com/office/drawing/2014/main" xmlns:mv="urn:schemas-microsoft-com:mac:vml" xmlns:mc="http://schemas.openxmlformats.org/markup-compatibility/2006" id="{874D3B7F-A68B-CD49-940D-1DE544A27944}"/>
               </a:ext>
             </a:extLst>
           </p:cNvPr>
@@ -909,7 +909,7 @@
           <p:cNvPr id="6" name="Slide Number Placeholder 5">
             <a:extLst>
               <a:ext uri="{FF2B5EF4-FFF2-40B4-BE49-F238E27FC236}">
-                <a16:creationId xmlns:a16="http://schemas.microsoft.com/office/drawing/2014/main" xmlns:p="http://schemas.openxmlformats.org/presentationml/2006/main" xmlns:r="http://schemas.openxmlformats.org/officeDocument/2006/relationships" xmlns:a="http://schemas.openxmlformats.org/drawingml/2006/main" xmlns="" id="{578ECC6A-5BAB-3C4A-91B4-8195321DD5C4}"/>
+                <a16:creationId xmlns="" xmlns:a="http://schemas.openxmlformats.org/drawingml/2006/main" xmlns:r="http://schemas.openxmlformats.org/officeDocument/2006/relationships" xmlns:p="http://schemas.openxmlformats.org/presentationml/2006/main" xmlns:a16="http://schemas.microsoft.com/office/drawing/2014/main" xmlns:mv="urn:schemas-microsoft-com:mac:vml" xmlns:mc="http://schemas.openxmlformats.org/markup-compatibility/2006" id="{578ECC6A-5BAB-3C4A-91B4-8195321DD5C4}"/>
               </a:ext>
             </a:extLst>
           </p:cNvPr>
@@ -937,7 +937,7 @@
     </p:spTree>
     <p:extLst>
       <p:ext uri="{BB962C8B-B14F-4D97-AF65-F5344CB8AC3E}">
-        <p14:creationId xmlns:p14="http://schemas.microsoft.com/office/powerpoint/2010/main" xmlns:p="http://schemas.openxmlformats.org/presentationml/2006/main" xmlns:r="http://schemas.openxmlformats.org/officeDocument/2006/relationships" xmlns:a="http://schemas.openxmlformats.org/drawingml/2006/main" xmlns="" val="3757407368"/>
+        <p14:creationId xmlns="" xmlns:a="http://schemas.openxmlformats.org/drawingml/2006/main" xmlns:r="http://schemas.openxmlformats.org/officeDocument/2006/relationships" xmlns:p="http://schemas.openxmlformats.org/presentationml/2006/main" xmlns:p14="http://schemas.microsoft.com/office/powerpoint/2010/main" xmlns:mv="urn:schemas-microsoft-com:mac:vml" xmlns:mc="http://schemas.openxmlformats.org/markup-compatibility/2006" val="3757407368"/>
       </p:ext>
     </p:extLst>
   </p:cSld>
@@ -969,7 +969,7 @@
           <p:cNvPr id="2" name="Title 1">
             <a:extLst>
               <a:ext uri="{FF2B5EF4-FFF2-40B4-BE49-F238E27FC236}">
-                <a16:creationId xmlns:a16="http://schemas.microsoft.com/office/drawing/2014/main" xmlns:p="http://schemas.openxmlformats.org/presentationml/2006/main" xmlns:r="http://schemas.openxmlformats.org/officeDocument/2006/relationships" xmlns:a="http://schemas.openxmlformats.org/drawingml/2006/main" xmlns="" id="{A2A874DB-46C8-0C4A-A54B-15EF60A1D3B6}"/>
+                <a16:creationId xmlns="" xmlns:a="http://schemas.openxmlformats.org/drawingml/2006/main" xmlns:r="http://schemas.openxmlformats.org/officeDocument/2006/relationships" xmlns:p="http://schemas.openxmlformats.org/presentationml/2006/main" xmlns:a16="http://schemas.microsoft.com/office/drawing/2014/main" xmlns:mv="urn:schemas-microsoft-com:mac:vml" xmlns:mc="http://schemas.openxmlformats.org/markup-compatibility/2006" id="{A2A874DB-46C8-0C4A-A54B-15EF60A1D3B6}"/>
               </a:ext>
             </a:extLst>
           </p:cNvPr>
@@ -1006,7 +1006,7 @@
           <p:cNvPr id="3" name="Text Placeholder 2">
             <a:extLst>
               <a:ext uri="{FF2B5EF4-FFF2-40B4-BE49-F238E27FC236}">
-                <a16:creationId xmlns:a16="http://schemas.microsoft.com/office/drawing/2014/main" xmlns:p="http://schemas.openxmlformats.org/presentationml/2006/main" xmlns:r="http://schemas.openxmlformats.org/officeDocument/2006/relationships" xmlns:a="http://schemas.openxmlformats.org/drawingml/2006/main" xmlns="" id="{08BBC28A-0F1E-D346-A3A7-9C6326CB0602}"/>
+                <a16:creationId xmlns="" xmlns:a="http://schemas.openxmlformats.org/drawingml/2006/main" xmlns:r="http://schemas.openxmlformats.org/officeDocument/2006/relationships" xmlns:p="http://schemas.openxmlformats.org/presentationml/2006/main" xmlns:a16="http://schemas.microsoft.com/office/drawing/2014/main" xmlns:mv="urn:schemas-microsoft-com:mac:vml" xmlns:mc="http://schemas.openxmlformats.org/markup-compatibility/2006" id="{08BBC28A-0F1E-D346-A3A7-9C6326CB0602}"/>
               </a:ext>
             </a:extLst>
           </p:cNvPr>
@@ -1131,7 +1131,7 @@
           <p:cNvPr id="4" name="Date Placeholder 3">
             <a:extLst>
               <a:ext uri="{FF2B5EF4-FFF2-40B4-BE49-F238E27FC236}">
-                <a16:creationId xmlns:a16="http://schemas.microsoft.com/office/drawing/2014/main" xmlns:p="http://schemas.openxmlformats.org/presentationml/2006/main" xmlns:r="http://schemas.openxmlformats.org/officeDocument/2006/relationships" xmlns:a="http://schemas.openxmlformats.org/drawingml/2006/main" xmlns="" id="{07C94351-5011-224C-819A-71FD09CB6FF6}"/>
+                <a16:creationId xmlns="" xmlns:a="http://schemas.openxmlformats.org/drawingml/2006/main" xmlns:r="http://schemas.openxmlformats.org/officeDocument/2006/relationships" xmlns:p="http://schemas.openxmlformats.org/presentationml/2006/main" xmlns:a16="http://schemas.microsoft.com/office/drawing/2014/main" xmlns:mv="urn:schemas-microsoft-com:mac:vml" xmlns:mc="http://schemas.openxmlformats.org/markup-compatibility/2006" id="{07C94351-5011-224C-819A-71FD09CB6FF6}"/>
               </a:ext>
             </a:extLst>
           </p:cNvPr>
@@ -1150,7 +1150,7 @@
             <a:fld id="{00662177-2CA0-4843-8C19-73F5643914DD}" type="datetimeFigureOut">
               <a:rPr lang="en-US" smtClean="0"/>
               <a:pPr/>
-              <a:t>1/25/21</a:t>
+              <a:t>1/26/21</a:t>
             </a:fld>
             <a:endParaRPr lang="en-US"/>
           </a:p>
@@ -1161,7 +1161,7 @@
           <p:cNvPr id="5" name="Footer Placeholder 4">
             <a:extLst>
               <a:ext uri="{FF2B5EF4-FFF2-40B4-BE49-F238E27FC236}">
-                <a16:creationId xmlns:a16="http://schemas.microsoft.com/office/drawing/2014/main" xmlns:p="http://schemas.openxmlformats.org/presentationml/2006/main" xmlns:r="http://schemas.openxmlformats.org/officeDocument/2006/relationships" xmlns:a="http://schemas.openxmlformats.org/drawingml/2006/main" xmlns="" id="{65F6990D-9837-6845-87FE-A244FAD38080}"/>
+                <a16:creationId xmlns="" xmlns:a="http://schemas.openxmlformats.org/drawingml/2006/main" xmlns:r="http://schemas.openxmlformats.org/officeDocument/2006/relationships" xmlns:p="http://schemas.openxmlformats.org/presentationml/2006/main" xmlns:a16="http://schemas.microsoft.com/office/drawing/2014/main" xmlns:mv="urn:schemas-microsoft-com:mac:vml" xmlns:mc="http://schemas.openxmlformats.org/markup-compatibility/2006" id="{65F6990D-9837-6845-87FE-A244FAD38080}"/>
               </a:ext>
             </a:extLst>
           </p:cNvPr>
@@ -1186,7 +1186,7 @@
           <p:cNvPr id="6" name="Slide Number Placeholder 5">
             <a:extLst>
               <a:ext uri="{FF2B5EF4-FFF2-40B4-BE49-F238E27FC236}">
-                <a16:creationId xmlns:a16="http://schemas.microsoft.com/office/drawing/2014/main" xmlns:p="http://schemas.openxmlformats.org/presentationml/2006/main" xmlns:r="http://schemas.openxmlformats.org/officeDocument/2006/relationships" xmlns:a="http://schemas.openxmlformats.org/drawingml/2006/main" xmlns="" id="{C7560835-00A4-7A46-A47A-5F9B036E5EE8}"/>
+                <a16:creationId xmlns="" xmlns:a="http://schemas.openxmlformats.org/drawingml/2006/main" xmlns:r="http://schemas.openxmlformats.org/officeDocument/2006/relationships" xmlns:p="http://schemas.openxmlformats.org/presentationml/2006/main" xmlns:a16="http://schemas.microsoft.com/office/drawing/2014/main" xmlns:mv="urn:schemas-microsoft-com:mac:vml" xmlns:mc="http://schemas.openxmlformats.org/markup-compatibility/2006" id="{C7560835-00A4-7A46-A47A-5F9B036E5EE8}"/>
               </a:ext>
             </a:extLst>
           </p:cNvPr>
@@ -1214,7 +1214,7 @@
     </p:spTree>
     <p:extLst>
       <p:ext uri="{BB962C8B-B14F-4D97-AF65-F5344CB8AC3E}">
-        <p14:creationId xmlns:p14="http://schemas.microsoft.com/office/powerpoint/2010/main" xmlns:p="http://schemas.openxmlformats.org/presentationml/2006/main" xmlns:r="http://schemas.openxmlformats.org/officeDocument/2006/relationships" xmlns:a="http://schemas.openxmlformats.org/drawingml/2006/main" xmlns="" val="1703984407"/>
+        <p14:creationId xmlns="" xmlns:a="http://schemas.openxmlformats.org/drawingml/2006/main" xmlns:r="http://schemas.openxmlformats.org/officeDocument/2006/relationships" xmlns:p="http://schemas.openxmlformats.org/presentationml/2006/main" xmlns:p14="http://schemas.microsoft.com/office/powerpoint/2010/main" xmlns:mv="urn:schemas-microsoft-com:mac:vml" xmlns:mc="http://schemas.openxmlformats.org/markup-compatibility/2006" val="1703984407"/>
       </p:ext>
     </p:extLst>
   </p:cSld>
@@ -1246,7 +1246,7 @@
           <p:cNvPr id="2" name="Title 1">
             <a:extLst>
               <a:ext uri="{FF2B5EF4-FFF2-40B4-BE49-F238E27FC236}">
-                <a16:creationId xmlns:a16="http://schemas.microsoft.com/office/drawing/2014/main" xmlns:p="http://schemas.openxmlformats.org/presentationml/2006/main" xmlns:r="http://schemas.openxmlformats.org/officeDocument/2006/relationships" xmlns:a="http://schemas.openxmlformats.org/drawingml/2006/main" xmlns="" id="{E132B5C0-E1F6-644B-9C11-0AA2D07B6621}"/>
+                <a16:creationId xmlns="" xmlns:a="http://schemas.openxmlformats.org/drawingml/2006/main" xmlns:r="http://schemas.openxmlformats.org/officeDocument/2006/relationships" xmlns:p="http://schemas.openxmlformats.org/presentationml/2006/main" xmlns:a16="http://schemas.microsoft.com/office/drawing/2014/main" xmlns:mv="urn:schemas-microsoft-com:mac:vml" xmlns:mc="http://schemas.openxmlformats.org/markup-compatibility/2006" id="{E132B5C0-E1F6-644B-9C11-0AA2D07B6621}"/>
               </a:ext>
             </a:extLst>
           </p:cNvPr>
@@ -1274,7 +1274,7 @@
           <p:cNvPr id="3" name="Content Placeholder 2">
             <a:extLst>
               <a:ext uri="{FF2B5EF4-FFF2-40B4-BE49-F238E27FC236}">
-                <a16:creationId xmlns:a16="http://schemas.microsoft.com/office/drawing/2014/main" xmlns:p="http://schemas.openxmlformats.org/presentationml/2006/main" xmlns:r="http://schemas.openxmlformats.org/officeDocument/2006/relationships" xmlns:a="http://schemas.openxmlformats.org/drawingml/2006/main" xmlns="" id="{9D47F32F-2E34-2F47-810A-68DC1F298DE2}"/>
+                <a16:creationId xmlns="" xmlns:a="http://schemas.openxmlformats.org/drawingml/2006/main" xmlns:r="http://schemas.openxmlformats.org/officeDocument/2006/relationships" xmlns:p="http://schemas.openxmlformats.org/presentationml/2006/main" xmlns:a16="http://schemas.microsoft.com/office/drawing/2014/main" xmlns:mv="urn:schemas-microsoft-com:mac:vml" xmlns:mc="http://schemas.openxmlformats.org/markup-compatibility/2006" id="{9D47F32F-2E34-2F47-810A-68DC1F298DE2}"/>
               </a:ext>
             </a:extLst>
           </p:cNvPr>
@@ -1336,7 +1336,7 @@
           <p:cNvPr id="4" name="Content Placeholder 3">
             <a:extLst>
               <a:ext uri="{FF2B5EF4-FFF2-40B4-BE49-F238E27FC236}">
-                <a16:creationId xmlns:a16="http://schemas.microsoft.com/office/drawing/2014/main" xmlns:p="http://schemas.openxmlformats.org/presentationml/2006/main" xmlns:r="http://schemas.openxmlformats.org/officeDocument/2006/relationships" xmlns:a="http://schemas.openxmlformats.org/drawingml/2006/main" xmlns="" id="{02E583C8-180A-B841-87DD-8FDC566994B2}"/>
+                <a16:creationId xmlns="" xmlns:a="http://schemas.openxmlformats.org/drawingml/2006/main" xmlns:r="http://schemas.openxmlformats.org/officeDocument/2006/relationships" xmlns:p="http://schemas.openxmlformats.org/presentationml/2006/main" xmlns:a16="http://schemas.microsoft.com/office/drawing/2014/main" xmlns:mv="urn:schemas-microsoft-com:mac:vml" xmlns:mc="http://schemas.openxmlformats.org/markup-compatibility/2006" id="{02E583C8-180A-B841-87DD-8FDC566994B2}"/>
               </a:ext>
             </a:extLst>
           </p:cNvPr>
@@ -1398,7 +1398,7 @@
           <p:cNvPr id="5" name="Date Placeholder 4">
             <a:extLst>
               <a:ext uri="{FF2B5EF4-FFF2-40B4-BE49-F238E27FC236}">
-                <a16:creationId xmlns:a16="http://schemas.microsoft.com/office/drawing/2014/main" xmlns:p="http://schemas.openxmlformats.org/presentationml/2006/main" xmlns:r="http://schemas.openxmlformats.org/officeDocument/2006/relationships" xmlns:a="http://schemas.openxmlformats.org/drawingml/2006/main" xmlns="" id="{2F79A914-0FCC-7A47-ABFB-33C59436F8FB}"/>
+                <a16:creationId xmlns="" xmlns:a="http://schemas.openxmlformats.org/drawingml/2006/main" xmlns:r="http://schemas.openxmlformats.org/officeDocument/2006/relationships" xmlns:p="http://schemas.openxmlformats.org/presentationml/2006/main" xmlns:a16="http://schemas.microsoft.com/office/drawing/2014/main" xmlns:mv="urn:schemas-microsoft-com:mac:vml" xmlns:mc="http://schemas.openxmlformats.org/markup-compatibility/2006" id="{2F79A914-0FCC-7A47-ABFB-33C59436F8FB}"/>
               </a:ext>
             </a:extLst>
           </p:cNvPr>
@@ -1417,7 +1417,7 @@
             <a:fld id="{00662177-2CA0-4843-8C19-73F5643914DD}" type="datetimeFigureOut">
               <a:rPr lang="en-US" smtClean="0"/>
               <a:pPr/>
-              <a:t>1/25/21</a:t>
+              <a:t>1/26/21</a:t>
             </a:fld>
             <a:endParaRPr lang="en-US"/>
           </a:p>
@@ -1428,7 +1428,7 @@
           <p:cNvPr id="6" name="Footer Placeholder 5">
             <a:extLst>
               <a:ext uri="{FF2B5EF4-FFF2-40B4-BE49-F238E27FC236}">
-                <a16:creationId xmlns:a16="http://schemas.microsoft.com/office/drawing/2014/main" xmlns:p="http://schemas.openxmlformats.org/presentationml/2006/main" xmlns:r="http://schemas.openxmlformats.org/officeDocument/2006/relationships" xmlns:a="http://schemas.openxmlformats.org/drawingml/2006/main" xmlns="" id="{2582293F-0796-ED42-B372-5E45FE7D0F1E}"/>
+                <a16:creationId xmlns="" xmlns:a="http://schemas.openxmlformats.org/drawingml/2006/main" xmlns:r="http://schemas.openxmlformats.org/officeDocument/2006/relationships" xmlns:p="http://schemas.openxmlformats.org/presentationml/2006/main" xmlns:a16="http://schemas.microsoft.com/office/drawing/2014/main" xmlns:mv="urn:schemas-microsoft-com:mac:vml" xmlns:mc="http://schemas.openxmlformats.org/markup-compatibility/2006" id="{2582293F-0796-ED42-B372-5E45FE7D0F1E}"/>
               </a:ext>
             </a:extLst>
           </p:cNvPr>
@@ -1453,7 +1453,7 @@
           <p:cNvPr id="7" name="Slide Number Placeholder 6">
             <a:extLst>
               <a:ext uri="{FF2B5EF4-FFF2-40B4-BE49-F238E27FC236}">
-                <a16:creationId xmlns:a16="http://schemas.microsoft.com/office/drawing/2014/main" xmlns:p="http://schemas.openxmlformats.org/presentationml/2006/main" xmlns:r="http://schemas.openxmlformats.org/officeDocument/2006/relationships" xmlns:a="http://schemas.openxmlformats.org/drawingml/2006/main" xmlns="" id="{2F7B3D5A-F181-5945-9EA7-69005E15FE76}"/>
+                <a16:creationId xmlns="" xmlns:a="http://schemas.openxmlformats.org/drawingml/2006/main" xmlns:r="http://schemas.openxmlformats.org/officeDocument/2006/relationships" xmlns:p="http://schemas.openxmlformats.org/presentationml/2006/main" xmlns:a16="http://schemas.microsoft.com/office/drawing/2014/main" xmlns:mv="urn:schemas-microsoft-com:mac:vml" xmlns:mc="http://schemas.openxmlformats.org/markup-compatibility/2006" id="{2F7B3D5A-F181-5945-9EA7-69005E15FE76}"/>
               </a:ext>
             </a:extLst>
           </p:cNvPr>
@@ -1481,7 +1481,7 @@
     </p:spTree>
     <p:extLst>
       <p:ext uri="{BB962C8B-B14F-4D97-AF65-F5344CB8AC3E}">
-        <p14:creationId xmlns:p14="http://schemas.microsoft.com/office/powerpoint/2010/main" xmlns:p="http://schemas.openxmlformats.org/presentationml/2006/main" xmlns:r="http://schemas.openxmlformats.org/officeDocument/2006/relationships" xmlns:a="http://schemas.openxmlformats.org/drawingml/2006/main" xmlns="" val="2919252464"/>
+        <p14:creationId xmlns="" xmlns:a="http://schemas.openxmlformats.org/drawingml/2006/main" xmlns:r="http://schemas.openxmlformats.org/officeDocument/2006/relationships" xmlns:p="http://schemas.openxmlformats.org/presentationml/2006/main" xmlns:p14="http://schemas.microsoft.com/office/powerpoint/2010/main" xmlns:mv="urn:schemas-microsoft-com:mac:vml" xmlns:mc="http://schemas.openxmlformats.org/markup-compatibility/2006" val="2919252464"/>
       </p:ext>
     </p:extLst>
   </p:cSld>
@@ -1513,7 +1513,7 @@
           <p:cNvPr id="2" name="Title 1">
             <a:extLst>
               <a:ext uri="{FF2B5EF4-FFF2-40B4-BE49-F238E27FC236}">
-                <a16:creationId xmlns:a16="http://schemas.microsoft.com/office/drawing/2014/main" xmlns:p="http://schemas.openxmlformats.org/presentationml/2006/main" xmlns:r="http://schemas.openxmlformats.org/officeDocument/2006/relationships" xmlns:a="http://schemas.openxmlformats.org/drawingml/2006/main" xmlns="" id="{C3DBF7E8-C39D-FC4A-9CCC-0EFB8634D44A}"/>
+                <a16:creationId xmlns="" xmlns:a="http://schemas.openxmlformats.org/drawingml/2006/main" xmlns:r="http://schemas.openxmlformats.org/officeDocument/2006/relationships" xmlns:p="http://schemas.openxmlformats.org/presentationml/2006/main" xmlns:a16="http://schemas.microsoft.com/office/drawing/2014/main" xmlns:mv="urn:schemas-microsoft-com:mac:vml" xmlns:mc="http://schemas.openxmlformats.org/markup-compatibility/2006" id="{C3DBF7E8-C39D-FC4A-9CCC-0EFB8634D44A}"/>
               </a:ext>
             </a:extLst>
           </p:cNvPr>
@@ -1546,7 +1546,7 @@
           <p:cNvPr id="3" name="Text Placeholder 2">
             <a:extLst>
               <a:ext uri="{FF2B5EF4-FFF2-40B4-BE49-F238E27FC236}">
-                <a16:creationId xmlns:a16="http://schemas.microsoft.com/office/drawing/2014/main" xmlns:p="http://schemas.openxmlformats.org/presentationml/2006/main" xmlns:r="http://schemas.openxmlformats.org/officeDocument/2006/relationships" xmlns:a="http://schemas.openxmlformats.org/drawingml/2006/main" xmlns="" id="{2996B2F6-DE31-3A45-80E6-1BA3AA1FE536}"/>
+                <a16:creationId xmlns="" xmlns:a="http://schemas.openxmlformats.org/drawingml/2006/main" xmlns:r="http://schemas.openxmlformats.org/officeDocument/2006/relationships" xmlns:p="http://schemas.openxmlformats.org/presentationml/2006/main" xmlns:a16="http://schemas.microsoft.com/office/drawing/2014/main" xmlns:mv="urn:schemas-microsoft-com:mac:vml" xmlns:mc="http://schemas.openxmlformats.org/markup-compatibility/2006" id="{2996B2F6-DE31-3A45-80E6-1BA3AA1FE536}"/>
               </a:ext>
             </a:extLst>
           </p:cNvPr>
@@ -1617,7 +1617,7 @@
           <p:cNvPr id="4" name="Content Placeholder 3">
             <a:extLst>
               <a:ext uri="{FF2B5EF4-FFF2-40B4-BE49-F238E27FC236}">
-                <a16:creationId xmlns:a16="http://schemas.microsoft.com/office/drawing/2014/main" xmlns:p="http://schemas.openxmlformats.org/presentationml/2006/main" xmlns:r="http://schemas.openxmlformats.org/officeDocument/2006/relationships" xmlns:a="http://schemas.openxmlformats.org/drawingml/2006/main" xmlns="" id="{F7B86116-9A0F-9F4A-94AF-4C10941E1181}"/>
+                <a16:creationId xmlns="" xmlns:a="http://schemas.openxmlformats.org/drawingml/2006/main" xmlns:r="http://schemas.openxmlformats.org/officeDocument/2006/relationships" xmlns:p="http://schemas.openxmlformats.org/presentationml/2006/main" xmlns:a16="http://schemas.microsoft.com/office/drawing/2014/main" xmlns:mv="urn:schemas-microsoft-com:mac:vml" xmlns:mc="http://schemas.openxmlformats.org/markup-compatibility/2006" id="{F7B86116-9A0F-9F4A-94AF-4C10941E1181}"/>
               </a:ext>
             </a:extLst>
           </p:cNvPr>
@@ -1679,7 +1679,7 @@
           <p:cNvPr id="5" name="Text Placeholder 4">
             <a:extLst>
               <a:ext uri="{FF2B5EF4-FFF2-40B4-BE49-F238E27FC236}">
-                <a16:creationId xmlns:a16="http://schemas.microsoft.com/office/drawing/2014/main" xmlns:p="http://schemas.openxmlformats.org/presentationml/2006/main" xmlns:r="http://schemas.openxmlformats.org/officeDocument/2006/relationships" xmlns:a="http://schemas.openxmlformats.org/drawingml/2006/main" xmlns="" id="{9CE0DBF9-206B-7A46-BD82-228376AFE5CC}"/>
+                <a16:creationId xmlns="" xmlns:a="http://schemas.openxmlformats.org/drawingml/2006/main" xmlns:r="http://schemas.openxmlformats.org/officeDocument/2006/relationships" xmlns:p="http://schemas.openxmlformats.org/presentationml/2006/main" xmlns:a16="http://schemas.microsoft.com/office/drawing/2014/main" xmlns:mv="urn:schemas-microsoft-com:mac:vml" xmlns:mc="http://schemas.openxmlformats.org/markup-compatibility/2006" id="{9CE0DBF9-206B-7A46-BD82-228376AFE5CC}"/>
               </a:ext>
             </a:extLst>
           </p:cNvPr>
@@ -1750,7 +1750,7 @@
           <p:cNvPr id="6" name="Content Placeholder 5">
             <a:extLst>
               <a:ext uri="{FF2B5EF4-FFF2-40B4-BE49-F238E27FC236}">
-                <a16:creationId xmlns:a16="http://schemas.microsoft.com/office/drawing/2014/main" xmlns:p="http://schemas.openxmlformats.org/presentationml/2006/main" xmlns:r="http://schemas.openxmlformats.org/officeDocument/2006/relationships" xmlns:a="http://schemas.openxmlformats.org/drawingml/2006/main" xmlns="" id="{8D9D61CA-717C-6F46-B375-1E4011250393}"/>
+                <a16:creationId xmlns="" xmlns:a="http://schemas.openxmlformats.org/drawingml/2006/main" xmlns:r="http://schemas.openxmlformats.org/officeDocument/2006/relationships" xmlns:p="http://schemas.openxmlformats.org/presentationml/2006/main" xmlns:a16="http://schemas.microsoft.com/office/drawing/2014/main" xmlns:mv="urn:schemas-microsoft-com:mac:vml" xmlns:mc="http://schemas.openxmlformats.org/markup-compatibility/2006" id="{8D9D61CA-717C-6F46-B375-1E4011250393}"/>
               </a:ext>
             </a:extLst>
           </p:cNvPr>
@@ -1812,7 +1812,7 @@
           <p:cNvPr id="7" name="Date Placeholder 6">
             <a:extLst>
               <a:ext uri="{FF2B5EF4-FFF2-40B4-BE49-F238E27FC236}">
-                <a16:creationId xmlns:a16="http://schemas.microsoft.com/office/drawing/2014/main" xmlns:p="http://schemas.openxmlformats.org/presentationml/2006/main" xmlns:r="http://schemas.openxmlformats.org/officeDocument/2006/relationships" xmlns:a="http://schemas.openxmlformats.org/drawingml/2006/main" xmlns="" id="{D676F978-15B5-B24E-992B-E9FE4CFF49B8}"/>
+                <a16:creationId xmlns="" xmlns:a="http://schemas.openxmlformats.org/drawingml/2006/main" xmlns:r="http://schemas.openxmlformats.org/officeDocument/2006/relationships" xmlns:p="http://schemas.openxmlformats.org/presentationml/2006/main" xmlns:a16="http://schemas.microsoft.com/office/drawing/2014/main" xmlns:mv="urn:schemas-microsoft-com:mac:vml" xmlns:mc="http://schemas.openxmlformats.org/markup-compatibility/2006" id="{D676F978-15B5-B24E-992B-E9FE4CFF49B8}"/>
               </a:ext>
             </a:extLst>
           </p:cNvPr>
@@ -1831,7 +1831,7 @@
             <a:fld id="{00662177-2CA0-4843-8C19-73F5643914DD}" type="datetimeFigureOut">
               <a:rPr lang="en-US" smtClean="0"/>
               <a:pPr/>
-              <a:t>1/25/21</a:t>
+              <a:t>1/26/21</a:t>
             </a:fld>
             <a:endParaRPr lang="en-US"/>
           </a:p>
@@ -1842,7 +1842,7 @@
           <p:cNvPr id="8" name="Footer Placeholder 7">
             <a:extLst>
               <a:ext uri="{FF2B5EF4-FFF2-40B4-BE49-F238E27FC236}">
-                <a16:creationId xmlns:a16="http://schemas.microsoft.com/office/drawing/2014/main" xmlns:p="http://schemas.openxmlformats.org/presentationml/2006/main" xmlns:r="http://schemas.openxmlformats.org/officeDocument/2006/relationships" xmlns:a="http://schemas.openxmlformats.org/drawingml/2006/main" xmlns="" id="{C0630F12-33ED-1949-B3FA-C32A0ECF1550}"/>
+                <a16:creationId xmlns="" xmlns:a="http://schemas.openxmlformats.org/drawingml/2006/main" xmlns:r="http://schemas.openxmlformats.org/officeDocument/2006/relationships" xmlns:p="http://schemas.openxmlformats.org/presentationml/2006/main" xmlns:a16="http://schemas.microsoft.com/office/drawing/2014/main" xmlns:mv="urn:schemas-microsoft-com:mac:vml" xmlns:mc="http://schemas.openxmlformats.org/markup-compatibility/2006" id="{C0630F12-33ED-1949-B3FA-C32A0ECF1550}"/>
               </a:ext>
             </a:extLst>
           </p:cNvPr>
@@ -1867,7 +1867,7 @@
           <p:cNvPr id="9" name="Slide Number Placeholder 8">
             <a:extLst>
               <a:ext uri="{FF2B5EF4-FFF2-40B4-BE49-F238E27FC236}">
-                <a16:creationId xmlns:a16="http://schemas.microsoft.com/office/drawing/2014/main" xmlns:p="http://schemas.openxmlformats.org/presentationml/2006/main" xmlns:r="http://schemas.openxmlformats.org/officeDocument/2006/relationships" xmlns:a="http://schemas.openxmlformats.org/drawingml/2006/main" xmlns="" id="{EC5E6D97-8152-C047-AAC2-F16EB83BBAF5}"/>
+                <a16:creationId xmlns="" xmlns:a="http://schemas.openxmlformats.org/drawingml/2006/main" xmlns:r="http://schemas.openxmlformats.org/officeDocument/2006/relationships" xmlns:p="http://schemas.openxmlformats.org/presentationml/2006/main" xmlns:a16="http://schemas.microsoft.com/office/drawing/2014/main" xmlns:mv="urn:schemas-microsoft-com:mac:vml" xmlns:mc="http://schemas.openxmlformats.org/markup-compatibility/2006" id="{EC5E6D97-8152-C047-AAC2-F16EB83BBAF5}"/>
               </a:ext>
             </a:extLst>
           </p:cNvPr>
@@ -1895,7 +1895,7 @@
     </p:spTree>
     <p:extLst>
       <p:ext uri="{BB962C8B-B14F-4D97-AF65-F5344CB8AC3E}">
-        <p14:creationId xmlns:p14="http://schemas.microsoft.com/office/powerpoint/2010/main" xmlns:p="http://schemas.openxmlformats.org/presentationml/2006/main" xmlns:r="http://schemas.openxmlformats.org/officeDocument/2006/relationships" xmlns:a="http://schemas.openxmlformats.org/drawingml/2006/main" xmlns="" val="3483189744"/>
+        <p14:creationId xmlns="" xmlns:a="http://schemas.openxmlformats.org/drawingml/2006/main" xmlns:r="http://schemas.openxmlformats.org/officeDocument/2006/relationships" xmlns:p="http://schemas.openxmlformats.org/presentationml/2006/main" xmlns:p14="http://schemas.microsoft.com/office/powerpoint/2010/main" xmlns:mv="urn:schemas-microsoft-com:mac:vml" xmlns:mc="http://schemas.openxmlformats.org/markup-compatibility/2006" val="3483189744"/>
       </p:ext>
     </p:extLst>
   </p:cSld>
@@ -1927,7 +1927,7 @@
           <p:cNvPr id="2" name="Title 1">
             <a:extLst>
               <a:ext uri="{FF2B5EF4-FFF2-40B4-BE49-F238E27FC236}">
-                <a16:creationId xmlns:a16="http://schemas.microsoft.com/office/drawing/2014/main" xmlns:p="http://schemas.openxmlformats.org/presentationml/2006/main" xmlns:r="http://schemas.openxmlformats.org/officeDocument/2006/relationships" xmlns:a="http://schemas.openxmlformats.org/drawingml/2006/main" xmlns="" id="{B091A937-4212-7044-80DD-791F6B4E0CB5}"/>
+                <a16:creationId xmlns="" xmlns:a="http://schemas.openxmlformats.org/drawingml/2006/main" xmlns:r="http://schemas.openxmlformats.org/officeDocument/2006/relationships" xmlns:p="http://schemas.openxmlformats.org/presentationml/2006/main" xmlns:a16="http://schemas.microsoft.com/office/drawing/2014/main" xmlns:mv="urn:schemas-microsoft-com:mac:vml" xmlns:mc="http://schemas.openxmlformats.org/markup-compatibility/2006" id="{B091A937-4212-7044-80DD-791F6B4E0CB5}"/>
               </a:ext>
             </a:extLst>
           </p:cNvPr>
@@ -1955,7 +1955,7 @@
           <p:cNvPr id="3" name="Date Placeholder 2">
             <a:extLst>
               <a:ext uri="{FF2B5EF4-FFF2-40B4-BE49-F238E27FC236}">
-                <a16:creationId xmlns:a16="http://schemas.microsoft.com/office/drawing/2014/main" xmlns:p="http://schemas.openxmlformats.org/presentationml/2006/main" xmlns:r="http://schemas.openxmlformats.org/officeDocument/2006/relationships" xmlns:a="http://schemas.openxmlformats.org/drawingml/2006/main" xmlns="" id="{45863A74-489B-8C4D-A09B-D1305BB0F3B3}"/>
+                <a16:creationId xmlns="" xmlns:a="http://schemas.openxmlformats.org/drawingml/2006/main" xmlns:r="http://schemas.openxmlformats.org/officeDocument/2006/relationships" xmlns:p="http://schemas.openxmlformats.org/presentationml/2006/main" xmlns:a16="http://schemas.microsoft.com/office/drawing/2014/main" xmlns:mv="urn:schemas-microsoft-com:mac:vml" xmlns:mc="http://schemas.openxmlformats.org/markup-compatibility/2006" id="{45863A74-489B-8C4D-A09B-D1305BB0F3B3}"/>
               </a:ext>
             </a:extLst>
           </p:cNvPr>
@@ -1974,7 +1974,7 @@
             <a:fld id="{00662177-2CA0-4843-8C19-73F5643914DD}" type="datetimeFigureOut">
               <a:rPr lang="en-US" smtClean="0"/>
               <a:pPr/>
-              <a:t>1/25/21</a:t>
+              <a:t>1/26/21</a:t>
             </a:fld>
             <a:endParaRPr lang="en-US"/>
           </a:p>
@@ -1985,7 +1985,7 @@
           <p:cNvPr id="4" name="Footer Placeholder 3">
             <a:extLst>
               <a:ext uri="{FF2B5EF4-FFF2-40B4-BE49-F238E27FC236}">
-                <a16:creationId xmlns:a16="http://schemas.microsoft.com/office/drawing/2014/main" xmlns:p="http://schemas.openxmlformats.org/presentationml/2006/main" xmlns:r="http://schemas.openxmlformats.org/officeDocument/2006/relationships" xmlns:a="http://schemas.openxmlformats.org/drawingml/2006/main" xmlns="" id="{3658D7BB-94EF-0045-A456-4E59793684B1}"/>
+                <a16:creationId xmlns="" xmlns:a="http://schemas.openxmlformats.org/drawingml/2006/main" xmlns:r="http://schemas.openxmlformats.org/officeDocument/2006/relationships" xmlns:p="http://schemas.openxmlformats.org/presentationml/2006/main" xmlns:a16="http://schemas.microsoft.com/office/drawing/2014/main" xmlns:mv="urn:schemas-microsoft-com:mac:vml" xmlns:mc="http://schemas.openxmlformats.org/markup-compatibility/2006" id="{3658D7BB-94EF-0045-A456-4E59793684B1}"/>
               </a:ext>
             </a:extLst>
           </p:cNvPr>
@@ -2010,7 +2010,7 @@
           <p:cNvPr id="5" name="Slide Number Placeholder 4">
             <a:extLst>
               <a:ext uri="{FF2B5EF4-FFF2-40B4-BE49-F238E27FC236}">
-                <a16:creationId xmlns:a16="http://schemas.microsoft.com/office/drawing/2014/main" xmlns:p="http://schemas.openxmlformats.org/presentationml/2006/main" xmlns:r="http://schemas.openxmlformats.org/officeDocument/2006/relationships" xmlns:a="http://schemas.openxmlformats.org/drawingml/2006/main" xmlns="" id="{777163AF-D3ED-3D4C-BC30-187318A4BCA8}"/>
+                <a16:creationId xmlns="" xmlns:a="http://schemas.openxmlformats.org/drawingml/2006/main" xmlns:r="http://schemas.openxmlformats.org/officeDocument/2006/relationships" xmlns:p="http://schemas.openxmlformats.org/presentationml/2006/main" xmlns:a16="http://schemas.microsoft.com/office/drawing/2014/main" xmlns:mv="urn:schemas-microsoft-com:mac:vml" xmlns:mc="http://schemas.openxmlformats.org/markup-compatibility/2006" id="{777163AF-D3ED-3D4C-BC30-187318A4BCA8}"/>
               </a:ext>
             </a:extLst>
           </p:cNvPr>
@@ -2038,7 +2038,7 @@
     </p:spTree>
     <p:extLst>
       <p:ext uri="{BB962C8B-B14F-4D97-AF65-F5344CB8AC3E}">
-        <p14:creationId xmlns:p14="http://schemas.microsoft.com/office/powerpoint/2010/main" xmlns:p="http://schemas.openxmlformats.org/presentationml/2006/main" xmlns:r="http://schemas.openxmlformats.org/officeDocument/2006/relationships" xmlns:a="http://schemas.openxmlformats.org/drawingml/2006/main" xmlns="" val="479854292"/>
+        <p14:creationId xmlns="" xmlns:a="http://schemas.openxmlformats.org/drawingml/2006/main" xmlns:r="http://schemas.openxmlformats.org/officeDocument/2006/relationships" xmlns:p="http://schemas.openxmlformats.org/presentationml/2006/main" xmlns:p14="http://schemas.microsoft.com/office/powerpoint/2010/main" xmlns:mv="urn:schemas-microsoft-com:mac:vml" xmlns:mc="http://schemas.openxmlformats.org/markup-compatibility/2006" val="479854292"/>
       </p:ext>
     </p:extLst>
   </p:cSld>
@@ -2070,7 +2070,7 @@
           <p:cNvPr id="2" name="Date Placeholder 1">
             <a:extLst>
               <a:ext uri="{FF2B5EF4-FFF2-40B4-BE49-F238E27FC236}">
-                <a16:creationId xmlns:a16="http://schemas.microsoft.com/office/drawing/2014/main" xmlns:p="http://schemas.openxmlformats.org/presentationml/2006/main" xmlns:r="http://schemas.openxmlformats.org/officeDocument/2006/relationships" xmlns:a="http://schemas.openxmlformats.org/drawingml/2006/main" xmlns="" id="{1F751191-1FA5-724F-8F3E-F09D5B5AA78A}"/>
+                <a16:creationId xmlns="" xmlns:a="http://schemas.openxmlformats.org/drawingml/2006/main" xmlns:r="http://schemas.openxmlformats.org/officeDocument/2006/relationships" xmlns:p="http://schemas.openxmlformats.org/presentationml/2006/main" xmlns:a16="http://schemas.microsoft.com/office/drawing/2014/main" xmlns:mv="urn:schemas-microsoft-com:mac:vml" xmlns:mc="http://schemas.openxmlformats.org/markup-compatibility/2006" id="{1F751191-1FA5-724F-8F3E-F09D5B5AA78A}"/>
               </a:ext>
             </a:extLst>
           </p:cNvPr>
@@ -2089,7 +2089,7 @@
             <a:fld id="{00662177-2CA0-4843-8C19-73F5643914DD}" type="datetimeFigureOut">
               <a:rPr lang="en-US" smtClean="0"/>
               <a:pPr/>
-              <a:t>1/25/21</a:t>
+              <a:t>1/26/21</a:t>
             </a:fld>
             <a:endParaRPr lang="en-US"/>
           </a:p>
@@ -2100,7 +2100,7 @@
           <p:cNvPr id="3" name="Footer Placeholder 2">
             <a:extLst>
               <a:ext uri="{FF2B5EF4-FFF2-40B4-BE49-F238E27FC236}">
-                <a16:creationId xmlns:a16="http://schemas.microsoft.com/office/drawing/2014/main" xmlns:p="http://schemas.openxmlformats.org/presentationml/2006/main" xmlns:r="http://schemas.openxmlformats.org/officeDocument/2006/relationships" xmlns:a="http://schemas.openxmlformats.org/drawingml/2006/main" xmlns="" id="{642C04E3-BDB3-3B46-A633-29C956AB5C21}"/>
+                <a16:creationId xmlns="" xmlns:a="http://schemas.openxmlformats.org/drawingml/2006/main" xmlns:r="http://schemas.openxmlformats.org/officeDocument/2006/relationships" xmlns:p="http://schemas.openxmlformats.org/presentationml/2006/main" xmlns:a16="http://schemas.microsoft.com/office/drawing/2014/main" xmlns:mv="urn:schemas-microsoft-com:mac:vml" xmlns:mc="http://schemas.openxmlformats.org/markup-compatibility/2006" id="{642C04E3-BDB3-3B46-A633-29C956AB5C21}"/>
               </a:ext>
             </a:extLst>
           </p:cNvPr>
@@ -2125,7 +2125,7 @@
           <p:cNvPr id="4" name="Slide Number Placeholder 3">
             <a:extLst>
               <a:ext uri="{FF2B5EF4-FFF2-40B4-BE49-F238E27FC236}">
-                <a16:creationId xmlns:a16="http://schemas.microsoft.com/office/drawing/2014/main" xmlns:p="http://schemas.openxmlformats.org/presentationml/2006/main" xmlns:r="http://schemas.openxmlformats.org/officeDocument/2006/relationships" xmlns:a="http://schemas.openxmlformats.org/drawingml/2006/main" xmlns="" id="{BC9BA764-6164-584D-A257-2DD25FC341AE}"/>
+                <a16:creationId xmlns="" xmlns:a="http://schemas.openxmlformats.org/drawingml/2006/main" xmlns:r="http://schemas.openxmlformats.org/officeDocument/2006/relationships" xmlns:p="http://schemas.openxmlformats.org/presentationml/2006/main" xmlns:a16="http://schemas.microsoft.com/office/drawing/2014/main" xmlns:mv="urn:schemas-microsoft-com:mac:vml" xmlns:mc="http://schemas.openxmlformats.org/markup-compatibility/2006" id="{BC9BA764-6164-584D-A257-2DD25FC341AE}"/>
               </a:ext>
             </a:extLst>
           </p:cNvPr>
@@ -2153,7 +2153,7 @@
     </p:spTree>
     <p:extLst>
       <p:ext uri="{BB962C8B-B14F-4D97-AF65-F5344CB8AC3E}">
-        <p14:creationId xmlns:p14="http://schemas.microsoft.com/office/powerpoint/2010/main" xmlns:p="http://schemas.openxmlformats.org/presentationml/2006/main" xmlns:r="http://schemas.openxmlformats.org/officeDocument/2006/relationships" xmlns:a="http://schemas.openxmlformats.org/drawingml/2006/main" xmlns="" val="2161033113"/>
+        <p14:creationId xmlns="" xmlns:a="http://schemas.openxmlformats.org/drawingml/2006/main" xmlns:r="http://schemas.openxmlformats.org/officeDocument/2006/relationships" xmlns:p="http://schemas.openxmlformats.org/presentationml/2006/main" xmlns:p14="http://schemas.microsoft.com/office/powerpoint/2010/main" xmlns:mv="urn:schemas-microsoft-com:mac:vml" xmlns:mc="http://schemas.openxmlformats.org/markup-compatibility/2006" val="2161033113"/>
       </p:ext>
     </p:extLst>
   </p:cSld>
@@ -2185,7 +2185,7 @@
           <p:cNvPr id="2" name="Title 1">
             <a:extLst>
               <a:ext uri="{FF2B5EF4-FFF2-40B4-BE49-F238E27FC236}">
-                <a16:creationId xmlns:a16="http://schemas.microsoft.com/office/drawing/2014/main" xmlns:p="http://schemas.openxmlformats.org/presentationml/2006/main" xmlns:r="http://schemas.openxmlformats.org/officeDocument/2006/relationships" xmlns:a="http://schemas.openxmlformats.org/drawingml/2006/main" xmlns="" id="{9675CEC7-85E0-4145-B5F8-0FD9F2E013B8}"/>
+                <a16:creationId xmlns="" xmlns:a="http://schemas.openxmlformats.org/drawingml/2006/main" xmlns:r="http://schemas.openxmlformats.org/officeDocument/2006/relationships" xmlns:p="http://schemas.openxmlformats.org/presentationml/2006/main" xmlns:a16="http://schemas.microsoft.com/office/drawing/2014/main" xmlns:mv="urn:schemas-microsoft-com:mac:vml" xmlns:mc="http://schemas.openxmlformats.org/markup-compatibility/2006" id="{9675CEC7-85E0-4145-B5F8-0FD9F2E013B8}"/>
               </a:ext>
             </a:extLst>
           </p:cNvPr>
@@ -2222,7 +2222,7 @@
           <p:cNvPr id="3" name="Content Placeholder 2">
             <a:extLst>
               <a:ext uri="{FF2B5EF4-FFF2-40B4-BE49-F238E27FC236}">
-                <a16:creationId xmlns:a16="http://schemas.microsoft.com/office/drawing/2014/main" xmlns:p="http://schemas.openxmlformats.org/presentationml/2006/main" xmlns:r="http://schemas.openxmlformats.org/officeDocument/2006/relationships" xmlns:a="http://schemas.openxmlformats.org/drawingml/2006/main" xmlns="" id="{19DA88CC-E239-4C46-AB60-D2E3330437FF}"/>
+                <a16:creationId xmlns="" xmlns:a="http://schemas.openxmlformats.org/drawingml/2006/main" xmlns:r="http://schemas.openxmlformats.org/officeDocument/2006/relationships" xmlns:p="http://schemas.openxmlformats.org/presentationml/2006/main" xmlns:a16="http://schemas.microsoft.com/office/drawing/2014/main" xmlns:mv="urn:schemas-microsoft-com:mac:vml" xmlns:mc="http://schemas.openxmlformats.org/markup-compatibility/2006" id="{19DA88CC-E239-4C46-AB60-D2E3330437FF}"/>
               </a:ext>
             </a:extLst>
           </p:cNvPr>
@@ -2312,7 +2312,7 @@
           <p:cNvPr id="4" name="Text Placeholder 3">
             <a:extLst>
               <a:ext uri="{FF2B5EF4-FFF2-40B4-BE49-F238E27FC236}">
-                <a16:creationId xmlns:a16="http://schemas.microsoft.com/office/drawing/2014/main" xmlns:p="http://schemas.openxmlformats.org/presentationml/2006/main" xmlns:r="http://schemas.openxmlformats.org/officeDocument/2006/relationships" xmlns:a="http://schemas.openxmlformats.org/drawingml/2006/main" xmlns="" id="{7739BA10-DCE3-954A-84D4-8390F24695FE}"/>
+                <a16:creationId xmlns="" xmlns:a="http://schemas.openxmlformats.org/drawingml/2006/main" xmlns:r="http://schemas.openxmlformats.org/officeDocument/2006/relationships" xmlns:p="http://schemas.openxmlformats.org/presentationml/2006/main" xmlns:a16="http://schemas.microsoft.com/office/drawing/2014/main" xmlns:mv="urn:schemas-microsoft-com:mac:vml" xmlns:mc="http://schemas.openxmlformats.org/markup-compatibility/2006" id="{7739BA10-DCE3-954A-84D4-8390F24695FE}"/>
               </a:ext>
             </a:extLst>
           </p:cNvPr>
@@ -2383,7 +2383,7 @@
           <p:cNvPr id="5" name="Date Placeholder 4">
             <a:extLst>
               <a:ext uri="{FF2B5EF4-FFF2-40B4-BE49-F238E27FC236}">
-                <a16:creationId xmlns:a16="http://schemas.microsoft.com/office/drawing/2014/main" xmlns:p="http://schemas.openxmlformats.org/presentationml/2006/main" xmlns:r="http://schemas.openxmlformats.org/officeDocument/2006/relationships" xmlns:a="http://schemas.openxmlformats.org/drawingml/2006/main" xmlns="" id="{39F044B7-4561-914E-8FAC-3D8400F6A1CA}"/>
+                <a16:creationId xmlns="" xmlns:a="http://schemas.openxmlformats.org/drawingml/2006/main" xmlns:r="http://schemas.openxmlformats.org/officeDocument/2006/relationships" xmlns:p="http://schemas.openxmlformats.org/presentationml/2006/main" xmlns:a16="http://schemas.microsoft.com/office/drawing/2014/main" xmlns:mv="urn:schemas-microsoft-com:mac:vml" xmlns:mc="http://schemas.openxmlformats.org/markup-compatibility/2006" id="{39F044B7-4561-914E-8FAC-3D8400F6A1CA}"/>
               </a:ext>
             </a:extLst>
           </p:cNvPr>
@@ -2402,7 +2402,7 @@
             <a:fld id="{00662177-2CA0-4843-8C19-73F5643914DD}" type="datetimeFigureOut">
               <a:rPr lang="en-US" smtClean="0"/>
               <a:pPr/>
-              <a:t>1/25/21</a:t>
+              <a:t>1/26/21</a:t>
             </a:fld>
             <a:endParaRPr lang="en-US"/>
           </a:p>
@@ -2413,7 +2413,7 @@
           <p:cNvPr id="6" name="Footer Placeholder 5">
             <a:extLst>
               <a:ext uri="{FF2B5EF4-FFF2-40B4-BE49-F238E27FC236}">
-                <a16:creationId xmlns:a16="http://schemas.microsoft.com/office/drawing/2014/main" xmlns:p="http://schemas.openxmlformats.org/presentationml/2006/main" xmlns:r="http://schemas.openxmlformats.org/officeDocument/2006/relationships" xmlns:a="http://schemas.openxmlformats.org/drawingml/2006/main" xmlns="" id="{C5FCB20F-02E6-F149-87A2-77E12DCC6D99}"/>
+                <a16:creationId xmlns="" xmlns:a="http://schemas.openxmlformats.org/drawingml/2006/main" xmlns:r="http://schemas.openxmlformats.org/officeDocument/2006/relationships" xmlns:p="http://schemas.openxmlformats.org/presentationml/2006/main" xmlns:a16="http://schemas.microsoft.com/office/drawing/2014/main" xmlns:mv="urn:schemas-microsoft-com:mac:vml" xmlns:mc="http://schemas.openxmlformats.org/markup-compatibility/2006" id="{C5FCB20F-02E6-F149-87A2-77E12DCC6D99}"/>
               </a:ext>
             </a:extLst>
           </p:cNvPr>
@@ -2438,7 +2438,7 @@
           <p:cNvPr id="7" name="Slide Number Placeholder 6">
             <a:extLst>
               <a:ext uri="{FF2B5EF4-FFF2-40B4-BE49-F238E27FC236}">
-                <a16:creationId xmlns:a16="http://schemas.microsoft.com/office/drawing/2014/main" xmlns:p="http://schemas.openxmlformats.org/presentationml/2006/main" xmlns:r="http://schemas.openxmlformats.org/officeDocument/2006/relationships" xmlns:a="http://schemas.openxmlformats.org/drawingml/2006/main" xmlns="" id="{C187476F-3BD6-D84C-A928-34F841092D87}"/>
+                <a16:creationId xmlns="" xmlns:a="http://schemas.openxmlformats.org/drawingml/2006/main" xmlns:r="http://schemas.openxmlformats.org/officeDocument/2006/relationships" xmlns:p="http://schemas.openxmlformats.org/presentationml/2006/main" xmlns:a16="http://schemas.microsoft.com/office/drawing/2014/main" xmlns:mv="urn:schemas-microsoft-com:mac:vml" xmlns:mc="http://schemas.openxmlformats.org/markup-compatibility/2006" id="{C187476F-3BD6-D84C-A928-34F841092D87}"/>
               </a:ext>
             </a:extLst>
           </p:cNvPr>
@@ -2466,7 +2466,7 @@
     </p:spTree>
     <p:extLst>
       <p:ext uri="{BB962C8B-B14F-4D97-AF65-F5344CB8AC3E}">
-        <p14:creationId xmlns:p14="http://schemas.microsoft.com/office/powerpoint/2010/main" xmlns:p="http://schemas.openxmlformats.org/presentationml/2006/main" xmlns:r="http://schemas.openxmlformats.org/officeDocument/2006/relationships" xmlns:a="http://schemas.openxmlformats.org/drawingml/2006/main" xmlns="" val="1540034212"/>
+        <p14:creationId xmlns="" xmlns:a="http://schemas.openxmlformats.org/drawingml/2006/main" xmlns:r="http://schemas.openxmlformats.org/officeDocument/2006/relationships" xmlns:p="http://schemas.openxmlformats.org/presentationml/2006/main" xmlns:p14="http://schemas.microsoft.com/office/powerpoint/2010/main" xmlns:mv="urn:schemas-microsoft-com:mac:vml" xmlns:mc="http://schemas.openxmlformats.org/markup-compatibility/2006" val="1540034212"/>
       </p:ext>
     </p:extLst>
   </p:cSld>
@@ -2498,7 +2498,7 @@
           <p:cNvPr id="2" name="Title 1">
             <a:extLst>
               <a:ext uri="{FF2B5EF4-FFF2-40B4-BE49-F238E27FC236}">
-                <a16:creationId xmlns:a16="http://schemas.microsoft.com/office/drawing/2014/main" xmlns:p="http://schemas.openxmlformats.org/presentationml/2006/main" xmlns:r="http://schemas.openxmlformats.org/officeDocument/2006/relationships" xmlns:a="http://schemas.openxmlformats.org/drawingml/2006/main" xmlns="" id="{98632AFB-7435-614E-AD3B-24DB9C04EA48}"/>
+                <a16:creationId xmlns="" xmlns:a="http://schemas.openxmlformats.org/drawingml/2006/main" xmlns:r="http://schemas.openxmlformats.org/officeDocument/2006/relationships" xmlns:p="http://schemas.openxmlformats.org/presentationml/2006/main" xmlns:a16="http://schemas.microsoft.com/office/drawing/2014/main" xmlns:mv="urn:schemas-microsoft-com:mac:vml" xmlns:mc="http://schemas.openxmlformats.org/markup-compatibility/2006" id="{98632AFB-7435-614E-AD3B-24DB9C04EA48}"/>
               </a:ext>
             </a:extLst>
           </p:cNvPr>
@@ -2535,7 +2535,7 @@
           <p:cNvPr id="3" name="Picture Placeholder 2">
             <a:extLst>
               <a:ext uri="{FF2B5EF4-FFF2-40B4-BE49-F238E27FC236}">
-                <a16:creationId xmlns:a16="http://schemas.microsoft.com/office/drawing/2014/main" xmlns:p="http://schemas.openxmlformats.org/presentationml/2006/main" xmlns:r="http://schemas.openxmlformats.org/officeDocument/2006/relationships" xmlns:a="http://schemas.openxmlformats.org/drawingml/2006/main" xmlns="" id="{878DEE6E-8C3C-A845-B594-9F48A85EABD9}"/>
+                <a16:creationId xmlns="" xmlns:a="http://schemas.openxmlformats.org/drawingml/2006/main" xmlns:r="http://schemas.openxmlformats.org/officeDocument/2006/relationships" xmlns:p="http://schemas.openxmlformats.org/presentationml/2006/main" xmlns:a16="http://schemas.microsoft.com/office/drawing/2014/main" xmlns:mv="urn:schemas-microsoft-com:mac:vml" xmlns:mc="http://schemas.openxmlformats.org/markup-compatibility/2006" id="{878DEE6E-8C3C-A845-B594-9F48A85EABD9}"/>
               </a:ext>
             </a:extLst>
           </p:cNvPr>
@@ -2602,7 +2602,7 @@
           <p:cNvPr id="4" name="Text Placeholder 3">
             <a:extLst>
               <a:ext uri="{FF2B5EF4-FFF2-40B4-BE49-F238E27FC236}">
-                <a16:creationId xmlns:a16="http://schemas.microsoft.com/office/drawing/2014/main" xmlns:p="http://schemas.openxmlformats.org/presentationml/2006/main" xmlns:r="http://schemas.openxmlformats.org/officeDocument/2006/relationships" xmlns:a="http://schemas.openxmlformats.org/drawingml/2006/main" xmlns="" id="{10330FAB-A62F-134B-ADA4-8D3F81794758}"/>
+                <a16:creationId xmlns="" xmlns:a="http://schemas.openxmlformats.org/drawingml/2006/main" xmlns:r="http://schemas.openxmlformats.org/officeDocument/2006/relationships" xmlns:p="http://schemas.openxmlformats.org/presentationml/2006/main" xmlns:a16="http://schemas.microsoft.com/office/drawing/2014/main" xmlns:mv="urn:schemas-microsoft-com:mac:vml" xmlns:mc="http://schemas.openxmlformats.org/markup-compatibility/2006" id="{10330FAB-A62F-134B-ADA4-8D3F81794758}"/>
               </a:ext>
             </a:extLst>
           </p:cNvPr>
@@ -2673,7 +2673,7 @@
           <p:cNvPr id="5" name="Date Placeholder 4">
             <a:extLst>
               <a:ext uri="{FF2B5EF4-FFF2-40B4-BE49-F238E27FC236}">
-                <a16:creationId xmlns:a16="http://schemas.microsoft.com/office/drawing/2014/main" xmlns:p="http://schemas.openxmlformats.org/presentationml/2006/main" xmlns:r="http://schemas.openxmlformats.org/officeDocument/2006/relationships" xmlns:a="http://schemas.openxmlformats.org/drawingml/2006/main" xmlns="" id="{30C80D64-ECCB-B94A-9005-6946A6CAF90C}"/>
+                <a16:creationId xmlns="" xmlns:a="http://schemas.openxmlformats.org/drawingml/2006/main" xmlns:r="http://schemas.openxmlformats.org/officeDocument/2006/relationships" xmlns:p="http://schemas.openxmlformats.org/presentationml/2006/main" xmlns:a16="http://schemas.microsoft.com/office/drawing/2014/main" xmlns:mv="urn:schemas-microsoft-com:mac:vml" xmlns:mc="http://schemas.openxmlformats.org/markup-compatibility/2006" id="{30C80D64-ECCB-B94A-9005-6946A6CAF90C}"/>
               </a:ext>
             </a:extLst>
           </p:cNvPr>
@@ -2692,7 +2692,7 @@
             <a:fld id="{00662177-2CA0-4843-8C19-73F5643914DD}" type="datetimeFigureOut">
               <a:rPr lang="en-US" smtClean="0"/>
               <a:pPr/>
-              <a:t>1/25/21</a:t>
+              <a:t>1/26/21</a:t>
             </a:fld>
             <a:endParaRPr lang="en-US"/>
           </a:p>
@@ -2703,7 +2703,7 @@
           <p:cNvPr id="6" name="Footer Placeholder 5">
             <a:extLst>
               <a:ext uri="{FF2B5EF4-FFF2-40B4-BE49-F238E27FC236}">
-                <a16:creationId xmlns:a16="http://schemas.microsoft.com/office/drawing/2014/main" xmlns:p="http://schemas.openxmlformats.org/presentationml/2006/main" xmlns:r="http://schemas.openxmlformats.org/officeDocument/2006/relationships" xmlns:a="http://schemas.openxmlformats.org/drawingml/2006/main" xmlns="" id="{92AC1752-DD45-504E-BF65-D920A673A2D1}"/>
+                <a16:creationId xmlns="" xmlns:a="http://schemas.openxmlformats.org/drawingml/2006/main" xmlns:r="http://schemas.openxmlformats.org/officeDocument/2006/relationships" xmlns:p="http://schemas.openxmlformats.org/presentationml/2006/main" xmlns:a16="http://schemas.microsoft.com/office/drawing/2014/main" xmlns:mv="urn:schemas-microsoft-com:mac:vml" xmlns:mc="http://schemas.openxmlformats.org/markup-compatibility/2006" id="{92AC1752-DD45-504E-BF65-D920A673A2D1}"/>
               </a:ext>
             </a:extLst>
           </p:cNvPr>
@@ -2728,7 +2728,7 @@
           <p:cNvPr id="7" name="Slide Number Placeholder 6">
             <a:extLst>
               <a:ext uri="{FF2B5EF4-FFF2-40B4-BE49-F238E27FC236}">
-                <a16:creationId xmlns:a16="http://schemas.microsoft.com/office/drawing/2014/main" xmlns:p="http://schemas.openxmlformats.org/presentationml/2006/main" xmlns:r="http://schemas.openxmlformats.org/officeDocument/2006/relationships" xmlns:a="http://schemas.openxmlformats.org/drawingml/2006/main" xmlns="" id="{F6BEBA20-4748-BE47-AD5F-C431FB0F1E09}"/>
+                <a16:creationId xmlns="" xmlns:a="http://schemas.openxmlformats.org/drawingml/2006/main" xmlns:r="http://schemas.openxmlformats.org/officeDocument/2006/relationships" xmlns:p="http://schemas.openxmlformats.org/presentationml/2006/main" xmlns:a16="http://schemas.microsoft.com/office/drawing/2014/main" xmlns:mv="urn:schemas-microsoft-com:mac:vml" xmlns:mc="http://schemas.openxmlformats.org/markup-compatibility/2006" id="{F6BEBA20-4748-BE47-AD5F-C431FB0F1E09}"/>
               </a:ext>
             </a:extLst>
           </p:cNvPr>
@@ -2756,7 +2756,7 @@
     </p:spTree>
     <p:extLst>
       <p:ext uri="{BB962C8B-B14F-4D97-AF65-F5344CB8AC3E}">
-        <p14:creationId xmlns:p14="http://schemas.microsoft.com/office/powerpoint/2010/main" xmlns:p="http://schemas.openxmlformats.org/presentationml/2006/main" xmlns:r="http://schemas.openxmlformats.org/officeDocument/2006/relationships" xmlns:a="http://schemas.openxmlformats.org/drawingml/2006/main" xmlns="" val="3874301069"/>
+        <p14:creationId xmlns="" xmlns:a="http://schemas.openxmlformats.org/drawingml/2006/main" xmlns:r="http://schemas.openxmlformats.org/officeDocument/2006/relationships" xmlns:p="http://schemas.openxmlformats.org/presentationml/2006/main" xmlns:p14="http://schemas.microsoft.com/office/powerpoint/2010/main" xmlns:mv="urn:schemas-microsoft-com:mac:vml" xmlns:mc="http://schemas.openxmlformats.org/markup-compatibility/2006" val="3874301069"/>
       </p:ext>
     </p:extLst>
   </p:cSld>
@@ -2793,7 +2793,7 @@
           <p:cNvPr id="2" name="Title Placeholder 1">
             <a:extLst>
               <a:ext uri="{FF2B5EF4-FFF2-40B4-BE49-F238E27FC236}">
-                <a16:creationId xmlns:a16="http://schemas.microsoft.com/office/drawing/2014/main" xmlns:p="http://schemas.openxmlformats.org/presentationml/2006/main" xmlns:r="http://schemas.openxmlformats.org/officeDocument/2006/relationships" xmlns:a="http://schemas.openxmlformats.org/drawingml/2006/main" xmlns="" id="{00C151BE-AC45-CF4B-8BEE-16A4DC84A52B}"/>
+                <a16:creationId xmlns="" xmlns:a="http://schemas.openxmlformats.org/drawingml/2006/main" xmlns:r="http://schemas.openxmlformats.org/officeDocument/2006/relationships" xmlns:p="http://schemas.openxmlformats.org/presentationml/2006/main" xmlns:a16="http://schemas.microsoft.com/office/drawing/2014/main" xmlns:mv="urn:schemas-microsoft-com:mac:vml" xmlns:mc="http://schemas.openxmlformats.org/markup-compatibility/2006" id="{00C151BE-AC45-CF4B-8BEE-16A4DC84A52B}"/>
               </a:ext>
             </a:extLst>
           </p:cNvPr>
@@ -2831,7 +2831,7 @@
           <p:cNvPr id="3" name="Text Placeholder 2">
             <a:extLst>
               <a:ext uri="{FF2B5EF4-FFF2-40B4-BE49-F238E27FC236}">
-                <a16:creationId xmlns:a16="http://schemas.microsoft.com/office/drawing/2014/main" xmlns:p="http://schemas.openxmlformats.org/presentationml/2006/main" xmlns:r="http://schemas.openxmlformats.org/officeDocument/2006/relationships" xmlns:a="http://schemas.openxmlformats.org/drawingml/2006/main" xmlns="" id="{7B11607B-8CF2-D044-9542-B70838661180}"/>
+                <a16:creationId xmlns="" xmlns:a="http://schemas.openxmlformats.org/drawingml/2006/main" xmlns:r="http://schemas.openxmlformats.org/officeDocument/2006/relationships" xmlns:p="http://schemas.openxmlformats.org/presentationml/2006/main" xmlns:a16="http://schemas.microsoft.com/office/drawing/2014/main" xmlns:mv="urn:schemas-microsoft-com:mac:vml" xmlns:mc="http://schemas.openxmlformats.org/markup-compatibility/2006" id="{7B11607B-8CF2-D044-9542-B70838661180}"/>
               </a:ext>
             </a:extLst>
           </p:cNvPr>
@@ -2898,7 +2898,7 @@
           <p:cNvPr id="4" name="Date Placeholder 3">
             <a:extLst>
               <a:ext uri="{FF2B5EF4-FFF2-40B4-BE49-F238E27FC236}">
-                <a16:creationId xmlns:a16="http://schemas.microsoft.com/office/drawing/2014/main" xmlns:p="http://schemas.openxmlformats.org/presentationml/2006/main" xmlns:r="http://schemas.openxmlformats.org/officeDocument/2006/relationships" xmlns:a="http://schemas.openxmlformats.org/drawingml/2006/main" xmlns="" id="{03CCC744-CD84-FC44-9A40-29700215E5F2}"/>
+                <a16:creationId xmlns="" xmlns:a="http://schemas.openxmlformats.org/drawingml/2006/main" xmlns:r="http://schemas.openxmlformats.org/officeDocument/2006/relationships" xmlns:p="http://schemas.openxmlformats.org/presentationml/2006/main" xmlns:a16="http://schemas.microsoft.com/office/drawing/2014/main" xmlns:mv="urn:schemas-microsoft-com:mac:vml" xmlns:mc="http://schemas.openxmlformats.org/markup-compatibility/2006" id="{03CCC744-CD84-FC44-9A40-29700215E5F2}"/>
               </a:ext>
             </a:extLst>
           </p:cNvPr>
@@ -2935,7 +2935,7 @@
             <a:fld id="{00662177-2CA0-4843-8C19-73F5643914DD}" type="datetimeFigureOut">
               <a:rPr lang="en-US" smtClean="0"/>
               <a:pPr/>
-              <a:t>1/25/21</a:t>
+              <a:t>1/26/21</a:t>
             </a:fld>
             <a:endParaRPr lang="en-US"/>
           </a:p>
@@ -2946,7 +2946,7 @@
           <p:cNvPr id="5" name="Footer Placeholder 4">
             <a:extLst>
               <a:ext uri="{FF2B5EF4-FFF2-40B4-BE49-F238E27FC236}">
-                <a16:creationId xmlns:a16="http://schemas.microsoft.com/office/drawing/2014/main" xmlns:p="http://schemas.openxmlformats.org/presentationml/2006/main" xmlns:r="http://schemas.openxmlformats.org/officeDocument/2006/relationships" xmlns:a="http://schemas.openxmlformats.org/drawingml/2006/main" xmlns="" id="{C31B4458-F774-F941-B116-68EC8939B494}"/>
+                <a16:creationId xmlns="" xmlns:a="http://schemas.openxmlformats.org/drawingml/2006/main" xmlns:r="http://schemas.openxmlformats.org/officeDocument/2006/relationships" xmlns:p="http://schemas.openxmlformats.org/presentationml/2006/main" xmlns:a16="http://schemas.microsoft.com/office/drawing/2014/main" xmlns:mv="urn:schemas-microsoft-com:mac:vml" xmlns:mc="http://schemas.openxmlformats.org/markup-compatibility/2006" id="{C31B4458-F774-F941-B116-68EC8939B494}"/>
               </a:ext>
             </a:extLst>
           </p:cNvPr>
@@ -2989,7 +2989,7 @@
           <p:cNvPr id="6" name="Slide Number Placeholder 5">
             <a:extLst>
               <a:ext uri="{FF2B5EF4-FFF2-40B4-BE49-F238E27FC236}">
-                <a16:creationId xmlns:a16="http://schemas.microsoft.com/office/drawing/2014/main" xmlns:p="http://schemas.openxmlformats.org/presentationml/2006/main" xmlns:r="http://schemas.openxmlformats.org/officeDocument/2006/relationships" xmlns:a="http://schemas.openxmlformats.org/drawingml/2006/main" xmlns="" id="{3936FC72-AC20-F646-AE2E-932E7D2606A1}"/>
+                <a16:creationId xmlns="" xmlns:a="http://schemas.openxmlformats.org/drawingml/2006/main" xmlns:r="http://schemas.openxmlformats.org/officeDocument/2006/relationships" xmlns:p="http://schemas.openxmlformats.org/presentationml/2006/main" xmlns:a16="http://schemas.microsoft.com/office/drawing/2014/main" xmlns:mv="urn:schemas-microsoft-com:mac:vml" xmlns:mc="http://schemas.openxmlformats.org/markup-compatibility/2006" id="{3936FC72-AC20-F646-AE2E-932E7D2606A1}"/>
               </a:ext>
             </a:extLst>
           </p:cNvPr>
@@ -3035,7 +3035,7 @@
     </p:spTree>
     <p:extLst>
       <p:ext uri="{BB962C8B-B14F-4D97-AF65-F5344CB8AC3E}">
-        <p14:creationId xmlns:p14="http://schemas.microsoft.com/office/powerpoint/2010/main" xmlns:p="http://schemas.openxmlformats.org/presentationml/2006/main" xmlns:r="http://schemas.openxmlformats.org/officeDocument/2006/relationships" xmlns:a="http://schemas.openxmlformats.org/drawingml/2006/main" xmlns="" val="101836462"/>
+        <p14:creationId xmlns="" xmlns:a="http://schemas.openxmlformats.org/drawingml/2006/main" xmlns:r="http://schemas.openxmlformats.org/officeDocument/2006/relationships" xmlns:p="http://schemas.openxmlformats.org/presentationml/2006/main" xmlns:p14="http://schemas.microsoft.com/office/powerpoint/2010/main" xmlns:mv="urn:schemas-microsoft-com:mac:vml" xmlns:mc="http://schemas.openxmlformats.org/markup-compatibility/2006" val="101836462"/>
       </p:ext>
     </p:extLst>
   </p:cSld>
@@ -3358,7 +3358,7 @@
           <p:cNvPr id="2" name="Title 1">
             <a:extLst>
               <a:ext uri="{FF2B5EF4-FFF2-40B4-BE49-F238E27FC236}">
-                <a16:creationId xmlns:a16="http://schemas.microsoft.com/office/drawing/2014/main" xmlns:p="http://schemas.openxmlformats.org/presentationml/2006/main" xmlns:r="http://schemas.openxmlformats.org/officeDocument/2006/relationships" xmlns:a="http://schemas.openxmlformats.org/drawingml/2006/main" xmlns="" id="{F6AB92C5-6891-434B-848C-ED956CFF5939}"/>
+                <a16:creationId xmlns="" xmlns:a="http://schemas.openxmlformats.org/drawingml/2006/main" xmlns:r="http://schemas.openxmlformats.org/officeDocument/2006/relationships" xmlns:p="http://schemas.openxmlformats.org/presentationml/2006/main" xmlns:a16="http://schemas.microsoft.com/office/drawing/2014/main" xmlns:mv="urn:schemas-microsoft-com:mac:vml" xmlns:mc="http://schemas.openxmlformats.org/markup-compatibility/2006" id="{F6AB92C5-6891-434B-848C-ED956CFF5939}"/>
               </a:ext>
             </a:extLst>
           </p:cNvPr>
@@ -3386,7 +3386,7 @@
           <p:cNvPr id="3" name="Subtitle 2">
             <a:extLst>
               <a:ext uri="{FF2B5EF4-FFF2-40B4-BE49-F238E27FC236}">
-                <a16:creationId xmlns:a16="http://schemas.microsoft.com/office/drawing/2014/main" xmlns:p="http://schemas.openxmlformats.org/presentationml/2006/main" xmlns:r="http://schemas.openxmlformats.org/officeDocument/2006/relationships" xmlns:a="http://schemas.openxmlformats.org/drawingml/2006/main" xmlns="" id="{C5B239A4-5682-BF4C-963F-675FE520A950}"/>
+                <a16:creationId xmlns="" xmlns:a="http://schemas.openxmlformats.org/drawingml/2006/main" xmlns:r="http://schemas.openxmlformats.org/officeDocument/2006/relationships" xmlns:p="http://schemas.openxmlformats.org/presentationml/2006/main" xmlns:a16="http://schemas.microsoft.com/office/drawing/2014/main" xmlns:mv="urn:schemas-microsoft-com:mac:vml" xmlns:mc="http://schemas.openxmlformats.org/markup-compatibility/2006" id="{C5B239A4-5682-BF4C-963F-675FE520A950}"/>
               </a:ext>
             </a:extLst>
           </p:cNvPr>
@@ -3409,7 +3409,7 @@
     </p:spTree>
     <p:extLst>
       <p:ext uri="{BB962C8B-B14F-4D97-AF65-F5344CB8AC3E}">
-        <p14:creationId xmlns:p14="http://schemas.microsoft.com/office/powerpoint/2010/main" xmlns:p="http://schemas.openxmlformats.org/presentationml/2006/main" xmlns:r="http://schemas.openxmlformats.org/officeDocument/2006/relationships" xmlns:a="http://schemas.openxmlformats.org/drawingml/2006/main" xmlns="" val="3781646698"/>
+        <p14:creationId xmlns="" xmlns:a="http://schemas.openxmlformats.org/drawingml/2006/main" xmlns:r="http://schemas.openxmlformats.org/officeDocument/2006/relationships" xmlns:p="http://schemas.openxmlformats.org/presentationml/2006/main" xmlns:p14="http://schemas.microsoft.com/office/powerpoint/2010/main" xmlns:mv="urn:schemas-microsoft-com:mac:vml" xmlns:mc="http://schemas.openxmlformats.org/markup-compatibility/2006" val="3781646698"/>
       </p:ext>
     </p:extLst>
   </p:cSld>
@@ -3441,7 +3441,7 @@
           <p:cNvPr id="2" name="Title 1">
             <a:extLst>
               <a:ext uri="{FF2B5EF4-FFF2-40B4-BE49-F238E27FC236}">
-                <a16:creationId xmlns:a16="http://schemas.microsoft.com/office/drawing/2014/main" xmlns:p="http://schemas.openxmlformats.org/presentationml/2006/main" xmlns:r="http://schemas.openxmlformats.org/officeDocument/2006/relationships" xmlns:a="http://schemas.openxmlformats.org/drawingml/2006/main" xmlns="" id="{F8E851E6-3DB7-7242-B2E9-A1CC6A5E83E3}"/>
+                <a16:creationId xmlns="" xmlns:a="http://schemas.openxmlformats.org/drawingml/2006/main" xmlns:r="http://schemas.openxmlformats.org/officeDocument/2006/relationships" xmlns:p="http://schemas.openxmlformats.org/presentationml/2006/main" xmlns:a16="http://schemas.microsoft.com/office/drawing/2014/main" xmlns:mv="urn:schemas-microsoft-com:mac:vml" xmlns:mc="http://schemas.openxmlformats.org/markup-compatibility/2006" id="{F8E851E6-3DB7-7242-B2E9-A1CC6A5E83E3}"/>
               </a:ext>
             </a:extLst>
           </p:cNvPr>
@@ -3469,7 +3469,7 @@
           <p:cNvPr id="3" name="Content Placeholder 2">
             <a:extLst>
               <a:ext uri="{FF2B5EF4-FFF2-40B4-BE49-F238E27FC236}">
-                <a16:creationId xmlns:a16="http://schemas.microsoft.com/office/drawing/2014/main" xmlns:p="http://schemas.openxmlformats.org/presentationml/2006/main" xmlns:r="http://schemas.openxmlformats.org/officeDocument/2006/relationships" xmlns:a="http://schemas.openxmlformats.org/drawingml/2006/main" xmlns="" id="{C41F4BA8-948C-DD46-8C95-8B589CF1DC8B}"/>
+                <a16:creationId xmlns="" xmlns:a="http://schemas.openxmlformats.org/drawingml/2006/main" xmlns:r="http://schemas.openxmlformats.org/officeDocument/2006/relationships" xmlns:p="http://schemas.openxmlformats.org/presentationml/2006/main" xmlns:a16="http://schemas.microsoft.com/office/drawing/2014/main" xmlns:mv="urn:schemas-microsoft-com:mac:vml" xmlns:mc="http://schemas.openxmlformats.org/markup-compatibility/2006" id="{C41F4BA8-948C-DD46-8C95-8B589CF1DC8B}"/>
               </a:ext>
             </a:extLst>
           </p:cNvPr>
@@ -3511,6 +3511,7 @@
               <a:rPr lang="en-US" dirty="0"/>
               <a:t> </a:t>
             </a:r>
+            <a:endParaRPr lang="en-US" dirty="0" smtClean="0"/>
           </a:p>
           <a:p>
             <a:pPr>
@@ -3518,12 +3519,20 @@
               <a:buChar char="Ø"/>
             </a:pPr>
             <a:r>
-              <a:rPr lang="en-US" dirty="0" err="1"/>
+              <a:rPr lang="en-US" dirty="0" smtClean="0"/>
+              <a:t> </a:t>
+            </a:r>
+            <a:r>
+              <a:rPr lang="en-US" dirty="0" err="1" smtClean="0"/>
               <a:t>createDB</a:t>
             </a:r>
             <a:r>
+              <a:rPr lang="en-US" dirty="0" smtClean="0"/>
+              <a:t> </a:t>
+            </a:r>
+            <a:r>
               <a:rPr lang="en-US" dirty="0"/>
-              <a:t> study-</a:t>
+              <a:t>study-</a:t>
             </a:r>
             <a:r>
               <a:rPr lang="en-US" dirty="0" err="1"/>
@@ -3533,6 +3542,7 @@
               <a:rPr lang="en-US" dirty="0"/>
               <a:t>  </a:t>
             </a:r>
+            <a:endParaRPr lang="en-US" dirty="0" smtClean="0"/>
           </a:p>
           <a:p>
             <a:pPr>
@@ -3540,13 +3550,22 @@
               <a:buChar char="Ø"/>
             </a:pPr>
             <a:r>
-              <a:rPr lang="en-US" dirty="0" err="1"/>
+              <a:rPr lang="en-US" dirty="0" smtClean="0"/>
+              <a:t> </a:t>
+            </a:r>
+            <a:r>
+              <a:rPr lang="en-US" dirty="0" err="1" smtClean="0"/>
               <a:t>npm</a:t>
             </a:r>
             <a:r>
+              <a:rPr lang="en-US" dirty="0" smtClean="0"/>
+              <a:t> </a:t>
+            </a:r>
+            <a:r>
               <a:rPr lang="en-US" dirty="0"/>
-              <a:t> install</a:t>
-            </a:r>
+              <a:t>install</a:t>
+            </a:r>
+            <a:endParaRPr lang="en-US" dirty="0" smtClean="0"/>
           </a:p>
           <a:p>
             <a:pPr>
@@ -3554,12 +3573,20 @@
               <a:buChar char="Ø"/>
             </a:pPr>
             <a:r>
-              <a:rPr lang="en-US" dirty="0" err="1"/>
+              <a:rPr lang="en-US" dirty="0" smtClean="0"/>
+              <a:t> </a:t>
+            </a:r>
+            <a:r>
+              <a:rPr lang="en-US" dirty="0" err="1" smtClean="0"/>
               <a:t>npm</a:t>
             </a:r>
             <a:r>
+              <a:rPr lang="en-US" dirty="0" smtClean="0"/>
+              <a:t> </a:t>
+            </a:r>
+            <a:r>
               <a:rPr lang="en-US" dirty="0"/>
-              <a:t> run seed</a:t>
+              <a:t>run seed</a:t>
             </a:r>
           </a:p>
           <a:p>
@@ -3577,7 +3604,7 @@
     </p:spTree>
     <p:extLst>
       <p:ext uri="{BB962C8B-B14F-4D97-AF65-F5344CB8AC3E}">
-        <p14:creationId xmlns:p14="http://schemas.microsoft.com/office/powerpoint/2010/main" xmlns:p="http://schemas.openxmlformats.org/presentationml/2006/main" xmlns:r="http://schemas.openxmlformats.org/officeDocument/2006/relationships" xmlns:a="http://schemas.openxmlformats.org/drawingml/2006/main" xmlns="" val="2321244046"/>
+        <p14:creationId xmlns="" xmlns:a="http://schemas.openxmlformats.org/drawingml/2006/main" xmlns:r="http://schemas.openxmlformats.org/officeDocument/2006/relationships" xmlns:p="http://schemas.openxmlformats.org/presentationml/2006/main" xmlns:p14="http://schemas.microsoft.com/office/powerpoint/2010/main" xmlns:mv="urn:schemas-microsoft-com:mac:vml" xmlns:mc="http://schemas.openxmlformats.org/markup-compatibility/2006" val="2321244046"/>
       </p:ext>
     </p:extLst>
   </p:cSld>
@@ -3609,7 +3636,7 @@
           <p:cNvPr id="2" name="Title 1">
             <a:extLst>
               <a:ext uri="{FF2B5EF4-FFF2-40B4-BE49-F238E27FC236}">
-                <a16:creationId xmlns:a16="http://schemas.microsoft.com/office/drawing/2014/main" xmlns:p="http://schemas.openxmlformats.org/presentationml/2006/main" xmlns:r="http://schemas.openxmlformats.org/officeDocument/2006/relationships" xmlns:a="http://schemas.openxmlformats.org/drawingml/2006/main" xmlns="" id="{E2462B74-34C6-884C-9390-E704EE952209}"/>
+                <a16:creationId xmlns="" xmlns:a="http://schemas.openxmlformats.org/drawingml/2006/main" xmlns:r="http://schemas.openxmlformats.org/officeDocument/2006/relationships" xmlns:p="http://schemas.openxmlformats.org/presentationml/2006/main" xmlns:a16="http://schemas.microsoft.com/office/drawing/2014/main" xmlns:mv="urn:schemas-microsoft-com:mac:vml" xmlns:mc="http://schemas.openxmlformats.org/markup-compatibility/2006" id="{E2462B74-34C6-884C-9390-E704EE952209}"/>
               </a:ext>
             </a:extLst>
           </p:cNvPr>
@@ -3631,11 +3658,7 @@
             </a:r>
             <a:r>
               <a:rPr lang="en-US" dirty="0" smtClean="0"/>
-              <a:t>Students in </a:t>
-            </a:r>
-            <a:r>
-              <a:rPr lang="en-US" dirty="0" smtClean="0"/>
-              <a:t>DB</a:t>
+              <a:t>Students</a:t>
             </a:r>
             <a:endParaRPr lang="en-US" dirty="0"/>
           </a:p>
@@ -3646,7 +3669,7 @@
           <p:cNvPr id="3" name="Content Placeholder 2">
             <a:extLst>
               <a:ext uri="{FF2B5EF4-FFF2-40B4-BE49-F238E27FC236}">
-                <a16:creationId xmlns:a16="http://schemas.microsoft.com/office/drawing/2014/main" xmlns:p="http://schemas.openxmlformats.org/presentationml/2006/main" xmlns:r="http://schemas.openxmlformats.org/officeDocument/2006/relationships" xmlns:a="http://schemas.openxmlformats.org/drawingml/2006/main" xmlns="" id="{D732B538-3036-7144-A3B3-13858BAE5C52}"/>
+                <a16:creationId xmlns="" xmlns:a="http://schemas.openxmlformats.org/drawingml/2006/main" xmlns:r="http://schemas.openxmlformats.org/officeDocument/2006/relationships" xmlns:p="http://schemas.openxmlformats.org/presentationml/2006/main" xmlns:a16="http://schemas.microsoft.com/office/drawing/2014/main" xmlns:mv="urn:schemas-microsoft-com:mac:vml" xmlns:mc="http://schemas.openxmlformats.org/markup-compatibility/2006" id="{D732B538-3036-7144-A3B3-13858BAE5C52}"/>
               </a:ext>
             </a:extLst>
           </p:cNvPr>
@@ -3674,9 +3697,14 @@
               <a:buChar char="Ø"/>
             </a:pPr>
             <a:r>
+              <a:rPr lang="en-US" dirty="0" smtClean="0"/>
+              <a:t> Starting </a:t>
+            </a:r>
+            <a:r>
               <a:rPr lang="en-US" dirty="0"/>
-              <a:t>Starting point: git checkout cycle-1</a:t>
-            </a:r>
+              <a:t>point: git checkout cycle-1</a:t>
+            </a:r>
+            <a:endParaRPr lang="en-US" dirty="0" smtClean="0"/>
           </a:p>
           <a:p>
             <a:pPr>
@@ -3684,8 +3712,12 @@
               <a:buChar char="Ø"/>
             </a:pPr>
             <a:r>
+              <a:rPr lang="en-US" dirty="0" smtClean="0"/>
+              <a:t> In </a:t>
+            </a:r>
+            <a:r>
               <a:rPr lang="en-US" dirty="0"/>
-              <a:t>In browser/ </a:t>
+              <a:t>browser/ </a:t>
             </a:r>
             <a:r>
               <a:rPr lang="en-US" dirty="0" err="1"/>
@@ -3708,19 +3740,46 @@
             </a:r>
             <a:r>
               <a:rPr lang="en-US" dirty="0"/>
-              <a:t>` and use the latter to render a heading that says “Hello React!</a:t>
+              <a:t>` and use</a:t>
             </a:r>
             <a:r>
               <a:rPr lang="en-US" dirty="0" smtClean="0"/>
-              <a:t>” (Hint: you’ll need to supply a DOM node from </a:t>
+              <a:t> the latter to render a </a:t>
+            </a:r>
+          </a:p>
+          <a:p>
+            <a:pPr lvl="1">
+              <a:buNone/>
+            </a:pPr>
+            <a:r>
+              <a:rPr lang="en-US" dirty="0" smtClean="0"/>
+              <a:t>heading that says “Hello React!” </a:t>
+            </a:r>
+          </a:p>
+          <a:p>
+            <a:pPr lvl="1">
+              <a:buFont typeface="Wingdings" pitchFamily="2" charset="2"/>
+              <a:buChar char="Ø"/>
+            </a:pPr>
+            <a:r>
+              <a:rPr lang="en-US" dirty="0" smtClean="0"/>
+              <a:t>Hint: you’ll need to </a:t>
+            </a:r>
+            <a:r>
+              <a:rPr lang="en-US" dirty="0" smtClean="0"/>
+              <a:t>use</a:t>
+            </a:r>
+            <a:r>
+              <a:rPr lang="en-US" dirty="0" smtClean="0"/>
+              <a:t> a </a:t>
+            </a:r>
+            <a:r>
+              <a:rPr lang="en-US" dirty="0" smtClean="0"/>
+              <a:t>DOM node from </a:t>
             </a:r>
             <a:r>
               <a:rPr lang="en-US" dirty="0" err="1" smtClean="0"/>
               <a:t>index.html</a:t>
-            </a:r>
-            <a:r>
-              <a:rPr lang="en-US" dirty="0" smtClean="0"/>
-              <a:t>)</a:t>
             </a:r>
             <a:endParaRPr lang="en-US" sz="2800" dirty="0" smtClean="0"/>
           </a:p>
@@ -3730,9 +3789,14 @@
               <a:buChar char="Ø"/>
             </a:pPr>
             <a:r>
+              <a:rPr lang="en-US" dirty="0" smtClean="0"/>
+              <a:t> Create </a:t>
+            </a:r>
+            <a:r>
               <a:rPr lang="en-US" dirty="0"/>
-              <a:t>Create a components folder in the browser folder.</a:t>
-            </a:r>
+              <a:t>a components folder in the browser folder.</a:t>
+            </a:r>
+            <a:endParaRPr lang="en-US" dirty="0" smtClean="0"/>
           </a:p>
           <a:p>
             <a:pPr>
@@ -3740,8 +3804,12 @@
               <a:buChar char="Ø"/>
             </a:pPr>
             <a:r>
+              <a:rPr lang="en-US" dirty="0" smtClean="0"/>
+              <a:t> In </a:t>
+            </a:r>
+            <a:r>
               <a:rPr lang="en-US" dirty="0"/>
-              <a:t>In that new components folder, create a &lt;Main&gt; component that fetches a list of all students from the server. It should render a table of</a:t>
+              <a:t>that new components folder, create a &lt;Main&gt; component that fetches a list of all students from the server. It should render a table of</a:t>
             </a:r>
             <a:r>
               <a:rPr lang="en-US" dirty="0" smtClean="0"/>
@@ -3759,6 +3827,7 @@
               <a:rPr lang="en-US" dirty="0"/>
               <a:t>the student’s full name</a:t>
             </a:r>
+            <a:endParaRPr lang="en-US" dirty="0" smtClean="0"/>
           </a:p>
           <a:p>
             <a:pPr>
@@ -3766,16 +3835,49 @@
               <a:buChar char="Ø"/>
             </a:pPr>
             <a:r>
+              <a:rPr lang="en-US" dirty="0" smtClean="0"/>
+              <a:t> Review </a:t>
+            </a:r>
+            <a:r>
               <a:rPr lang="en-US" dirty="0"/>
-              <a:t>Review at 1:00pm</a:t>
-            </a:r>
-          </a:p>
-        </p:txBody>
-      </p:sp>
+              <a:t>at </a:t>
+            </a:r>
+            <a:r>
+              <a:rPr lang="en-US" dirty="0" smtClean="0"/>
+              <a:t>12:45pm</a:t>
+            </a:r>
+            <a:endParaRPr lang="en-US" dirty="0"/>
+          </a:p>
+        </p:txBody>
+      </p:sp>
+      <p:pic>
+        <p:nvPicPr>
+          <p:cNvPr id="4" name="Picture 3" descr="Screen Shot 2021-01-26 at 3.24.38 PM.png"/>
+          <p:cNvPicPr>
+            <a:picLocks noChangeAspect="1"/>
+          </p:cNvPicPr>
+          <p:nvPr/>
+        </p:nvPicPr>
+        <p:blipFill>
+          <a:blip r:embed="rId2"/>
+          <a:stretch>
+            <a:fillRect/>
+          </a:stretch>
+        </p:blipFill>
+        <p:spPr>
+          <a:xfrm>
+            <a:off x="9423400" y="365125"/>
+            <a:ext cx="2768600" cy="3644900"/>
+          </a:xfrm>
+          <a:prstGeom prst="rect">
+            <a:avLst/>
+          </a:prstGeom>
+        </p:spPr>
+      </p:pic>
     </p:spTree>
     <p:extLst>
       <p:ext uri="{BB962C8B-B14F-4D97-AF65-F5344CB8AC3E}">
-        <p14:creationId xmlns:p14="http://schemas.microsoft.com/office/powerpoint/2010/main" xmlns:p="http://schemas.openxmlformats.org/presentationml/2006/main" xmlns:r="http://schemas.openxmlformats.org/officeDocument/2006/relationships" xmlns:a="http://schemas.openxmlformats.org/drawingml/2006/main" xmlns="" val="4228932031"/>
+        <p14:creationId xmlns="" xmlns:a="http://schemas.openxmlformats.org/drawingml/2006/main" xmlns:r="http://schemas.openxmlformats.org/officeDocument/2006/relationships" xmlns:p="http://schemas.openxmlformats.org/presentationml/2006/main" xmlns:p14="http://schemas.microsoft.com/office/powerpoint/2010/main" xmlns:mv="urn:schemas-microsoft-com:mac:vml" xmlns:mc="http://schemas.openxmlformats.org/markup-compatibility/2006" val="4228932031"/>
       </p:ext>
     </p:extLst>
   </p:cSld>
@@ -3807,7 +3909,7 @@
           <p:cNvPr id="2" name="Title 1">
             <a:extLst>
               <a:ext uri="{FF2B5EF4-FFF2-40B4-BE49-F238E27FC236}">
-                <a16:creationId xmlns:a16="http://schemas.microsoft.com/office/drawing/2014/main" xmlns:p="http://schemas.openxmlformats.org/presentationml/2006/main" xmlns:r="http://schemas.openxmlformats.org/officeDocument/2006/relationships" xmlns:a="http://schemas.openxmlformats.org/drawingml/2006/main" xmlns="" id="{E2462B74-34C6-884C-9390-E704EE952209}"/>
+                <a16:creationId xmlns="" xmlns:a="http://schemas.openxmlformats.org/drawingml/2006/main" xmlns:r="http://schemas.openxmlformats.org/officeDocument/2006/relationships" xmlns:p="http://schemas.openxmlformats.org/presentationml/2006/main" xmlns:a16="http://schemas.microsoft.com/office/drawing/2014/main" xmlns:mv="urn:schemas-microsoft-com:mac:vml" xmlns:mc="http://schemas.openxmlformats.org/markup-compatibility/2006" id="{E2462B74-34C6-884C-9390-E704EE952209}"/>
               </a:ext>
             </a:extLst>
           </p:cNvPr>
@@ -3843,7 +3945,7 @@
           <p:cNvPr id="3" name="Content Placeholder 2">
             <a:extLst>
               <a:ext uri="{FF2B5EF4-FFF2-40B4-BE49-F238E27FC236}">
-                <a16:creationId xmlns:a16="http://schemas.microsoft.com/office/drawing/2014/main" xmlns:p="http://schemas.openxmlformats.org/presentationml/2006/main" xmlns:r="http://schemas.openxmlformats.org/officeDocument/2006/relationships" xmlns:a="http://schemas.openxmlformats.org/drawingml/2006/main" xmlns="" id="{D732B538-3036-7144-A3B3-13858BAE5C52}"/>
+                <a16:creationId xmlns="" xmlns:a="http://schemas.openxmlformats.org/drawingml/2006/main" xmlns:r="http://schemas.openxmlformats.org/officeDocument/2006/relationships" xmlns:p="http://schemas.openxmlformats.org/presentationml/2006/main" xmlns:a16="http://schemas.microsoft.com/office/drawing/2014/main" xmlns:mv="urn:schemas-microsoft-com:mac:vml" xmlns:mc="http://schemas.openxmlformats.org/markup-compatibility/2006" id="{D732B538-3036-7144-A3B3-13858BAE5C52}"/>
               </a:ext>
             </a:extLst>
           </p:cNvPr>
@@ -3856,13 +3958,13 @@
         </p:nvSpPr>
         <p:spPr>
           <a:xfrm>
-            <a:off x="838200" y="1961444"/>
-            <a:ext cx="10515600" cy="4486275"/>
+            <a:off x="838200" y="1690688"/>
+            <a:ext cx="7882467" cy="4486275"/>
           </a:xfrm>
         </p:spPr>
         <p:txBody>
           <a:bodyPr>
-            <a:normAutofit fontScale="92500" lnSpcReduction="20000"/>
+            <a:normAutofit fontScale="85000" lnSpcReduction="20000"/>
           </a:bodyPr>
           <a:lstStyle/>
           <a:p>
@@ -3892,17 +3994,30 @@
             </a:r>
             <a:r>
               <a:rPr lang="en-US" dirty="0" smtClean="0"/>
-              <a:t> your list of students from cycle-1 into a </a:t>
+              <a:t> your list of students from cycle-1 into </a:t>
+            </a:r>
+            <a:r>
+              <a:rPr lang="en-US" dirty="0" smtClean="0"/>
+              <a:t>a </a:t>
             </a:r>
             <a:r>
               <a:rPr lang="en-US" dirty="0" err="1" smtClean="0"/>
               <a:t>StudentList</a:t>
             </a:r>
+            <a:endParaRPr lang="en-US" dirty="0" smtClean="0"/>
+          </a:p>
+          <a:p>
+            <a:pPr>
+              <a:buNone/>
+            </a:pPr>
             <a:r>
               <a:rPr lang="en-US" dirty="0" smtClean="0"/>
-              <a:t> component which will map and render each student</a:t>
-            </a:r>
-            <a:endParaRPr lang="en-US" dirty="0" smtClean="0"/>
+              <a:t> </a:t>
+            </a:r>
+            <a:r>
+              <a:rPr lang="en-US" dirty="0" smtClean="0"/>
+              <a:t>component which will map and render each student</a:t>
+            </a:r>
           </a:p>
           <a:p>
             <a:pPr>
@@ -3918,19 +4033,66 @@
             </a:pPr>
             <a:r>
               <a:rPr lang="en-US" dirty="0"/>
-              <a:t> In the second column, add a word like “Details”, that, when clicked, renders all of that student’s test scores below the </a:t>
+              <a:t> In the second column, add a word like “Details”, that, when clicked, </a:t>
             </a:r>
             <a:r>
               <a:rPr lang="en-US" dirty="0" smtClean="0"/>
-              <a:t>table</a:t>
-            </a:r>
+              <a:t>renders a </a:t>
+            </a:r>
+            <a:r>
+              <a:rPr lang="en-US" dirty="0" err="1" smtClean="0"/>
+              <a:t>SingleStudent</a:t>
+            </a:r>
+            <a:r>
+              <a:rPr lang="en-US" dirty="0" smtClean="0"/>
+              <a:t> component</a:t>
+            </a:r>
+          </a:p>
+          <a:p>
+            <a:pPr>
+              <a:buNone/>
+            </a:pPr>
+            <a:endParaRPr lang="en-US" dirty="0" smtClean="0"/>
           </a:p>
           <a:p>
             <a:pPr>
               <a:buFont typeface="Wingdings" pitchFamily="2" charset="2"/>
               <a:buChar char="Ø"/>
             </a:pPr>
-            <a:endParaRPr lang="en-US" dirty="0" smtClean="0"/>
+            <a:r>
+              <a:rPr lang="en-US" dirty="0" smtClean="0"/>
+              <a:t>Create</a:t>
+            </a:r>
+            <a:r>
+              <a:rPr lang="en-US" dirty="0" smtClean="0"/>
+              <a:t> </a:t>
+            </a:r>
+            <a:r>
+              <a:rPr lang="en-US" dirty="0" smtClean="0"/>
+              <a:t>a</a:t>
+            </a:r>
+            <a:r>
+              <a:rPr lang="en-US" dirty="0" smtClean="0"/>
+              <a:t> </a:t>
+            </a:r>
+            <a:r>
+              <a:rPr lang="en-US" dirty="0" err="1" smtClean="0"/>
+              <a:t>SingleStudent</a:t>
+            </a:r>
+            <a:r>
+              <a:rPr lang="en-US" dirty="0" smtClean="0"/>
+              <a:t> component to render the</a:t>
+            </a:r>
+            <a:r>
+              <a:rPr lang="en-US" dirty="0" smtClean="0"/>
+              <a:t> selected student’s test scores</a:t>
+            </a:r>
+          </a:p>
+          <a:p>
+            <a:pPr marL="0" indent="0">
+              <a:buNone/>
+            </a:pPr>
+            <a:endParaRPr lang="en-US" dirty="0"/>
           </a:p>
           <a:p>
             <a:pPr>
@@ -3938,41 +4100,45 @@
               <a:buChar char="Ø"/>
             </a:pPr>
             <a:r>
+              <a:rPr lang="en-US" dirty="0"/>
+              <a:t>Review at </a:t>
+            </a:r>
+            <a:r>
               <a:rPr lang="en-US" dirty="0" smtClean="0"/>
-              <a:t>Create a </a:t>
-            </a:r>
-            <a:r>
-              <a:rPr lang="en-US" dirty="0" err="1" smtClean="0"/>
-              <a:t>SingleStudent</a:t>
-            </a:r>
-            <a:r>
-              <a:rPr lang="en-US" dirty="0" smtClean="0"/>
-              <a:t> component to render the details</a:t>
-            </a:r>
-            <a:endParaRPr lang="en-US" dirty="0" smtClean="0"/>
-          </a:p>
-          <a:p>
-            <a:pPr marL="0" indent="0">
-              <a:buNone/>
-            </a:pPr>
+              <a:t>3:15pm</a:t>
+            </a:r>
             <a:endParaRPr lang="en-US" dirty="0"/>
           </a:p>
-          <a:p>
-            <a:pPr>
-              <a:buFont typeface="Wingdings" pitchFamily="2" charset="2"/>
-              <a:buChar char="Ø"/>
-            </a:pPr>
-            <a:r>
-              <a:rPr lang="en-US" dirty="0"/>
-              <a:t>Review at 3:30pm</a:t>
-            </a:r>
-          </a:p>
-        </p:txBody>
-      </p:sp>
+        </p:txBody>
+      </p:sp>
+      <p:pic>
+        <p:nvPicPr>
+          <p:cNvPr id="5" name="Picture 4" descr="Screen Shot 2021-01-26 at 3.29.48 PM.png"/>
+          <p:cNvPicPr>
+            <a:picLocks noChangeAspect="1"/>
+          </p:cNvPicPr>
+          <p:nvPr/>
+        </p:nvPicPr>
+        <p:blipFill>
+          <a:blip r:embed="rId2"/>
+          <a:stretch>
+            <a:fillRect/>
+          </a:stretch>
+        </p:blipFill>
+        <p:spPr>
+          <a:xfrm>
+            <a:off x="8686800" y="0"/>
+            <a:ext cx="3505200" cy="6794500"/>
+          </a:xfrm>
+          <a:prstGeom prst="rect">
+            <a:avLst/>
+          </a:prstGeom>
+        </p:spPr>
+      </p:pic>
     </p:spTree>
     <p:extLst>
       <p:ext uri="{BB962C8B-B14F-4D97-AF65-F5344CB8AC3E}">
-        <p14:creationId xmlns:p14="http://schemas.microsoft.com/office/powerpoint/2010/main" xmlns:p="http://schemas.openxmlformats.org/presentationml/2006/main" xmlns:r="http://schemas.openxmlformats.org/officeDocument/2006/relationships" xmlns:a="http://schemas.openxmlformats.org/drawingml/2006/main" xmlns="" val="2880849131"/>
+        <p14:creationId xmlns="" xmlns:a="http://schemas.openxmlformats.org/drawingml/2006/main" xmlns:r="http://schemas.openxmlformats.org/officeDocument/2006/relationships" xmlns:p="http://schemas.openxmlformats.org/presentationml/2006/main" xmlns:p14="http://schemas.microsoft.com/office/powerpoint/2010/main" xmlns:mv="urn:schemas-microsoft-com:mac:vml" xmlns:mc="http://schemas.openxmlformats.org/markup-compatibility/2006" val="2880849131"/>
       </p:ext>
     </p:extLst>
   </p:cSld>
@@ -4271,7 +4437,7 @@
   <a:extraClrSchemeLst/>
   <a:extLst>
     <a:ext uri="{05A4C25C-085E-4340-85A3-A5531E510DB2}">
-      <thm15:themeFamily xmlns:thm15="http://schemas.microsoft.com/office/thememl/2012/main" xmlns:a="http://schemas.openxmlformats.org/drawingml/2006/main" xmlns="" name="Office Theme" id="{62F939B6-93AF-4DB8-9C6B-D6C7DFDC589F}" vid="{4A3C46E8-61CC-4603-A589-7422A47A8E4A}"/>
+      <thm15:themeFamily xmlns="" xmlns:a="http://schemas.openxmlformats.org/drawingml/2006/main" xmlns:thm15="http://schemas.microsoft.com/office/thememl/2012/main" name="Office Theme" id="{62F939B6-93AF-4DB8-9C6B-D6C7DFDC589F}" vid="{4A3C46E8-61CC-4603-A589-7422A47A8E4A}"/>
     </a:ext>
   </a:extLst>
 </a:theme>

</xml_diff>